<commit_message>
Added in the info for my slides
</commit_message>
<xml_diff>
--- a/CMQA/Presentations/Tyler Slides/Tyler Slides.pptx
+++ b/CMQA/Presentations/Tyler Slides/Tyler Slides.pptx
@@ -6,6 +6,13 @@
   </p:sldMasterIdLst>
   <p:sldIdLst>
     <p:sldId id="257" r:id="rId2"/>
+    <p:sldId id="258" r:id="rId3"/>
+    <p:sldId id="259" r:id="rId4"/>
+    <p:sldId id="260" r:id="rId5"/>
+    <p:sldId id="261" r:id="rId6"/>
+    <p:sldId id="262" r:id="rId7"/>
+    <p:sldId id="263" r:id="rId8"/>
+    <p:sldId id="264" r:id="rId9"/>
   </p:sldIdLst>
   <p:sldSz cx="9144000" cy="6858000" type="screen4x3"/>
   <p:notesSz cx="6858000" cy="9144000"/>
@@ -288,7 +295,7 @@
           <a:p>
             <a:fld id="{12ACB943-4C8A-4DEC-8EFE-31A84E37E7F8}" type="datetimeFigureOut">
               <a:rPr lang="en-US" smtClean="0"/>
-              <a:t>11/10/2013</a:t>
+              <a:t>11/11/2013</a:t>
             </a:fld>
             <a:endParaRPr lang="en-US"/>
           </a:p>
@@ -458,7 +465,7 @@
           <a:p>
             <a:fld id="{12ACB943-4C8A-4DEC-8EFE-31A84E37E7F8}" type="datetimeFigureOut">
               <a:rPr lang="en-US" smtClean="0"/>
-              <a:t>11/10/2013</a:t>
+              <a:t>11/11/2013</a:t>
             </a:fld>
             <a:endParaRPr lang="en-US"/>
           </a:p>
@@ -638,7 +645,7 @@
           <a:p>
             <a:fld id="{12ACB943-4C8A-4DEC-8EFE-31A84E37E7F8}" type="datetimeFigureOut">
               <a:rPr lang="en-US" smtClean="0"/>
-              <a:t>11/10/2013</a:t>
+              <a:t>11/11/2013</a:t>
             </a:fld>
             <a:endParaRPr lang="en-US"/>
           </a:p>
@@ -808,7 +815,7 @@
           <a:p>
             <a:fld id="{12ACB943-4C8A-4DEC-8EFE-31A84E37E7F8}" type="datetimeFigureOut">
               <a:rPr lang="en-US" smtClean="0"/>
-              <a:t>11/10/2013</a:t>
+              <a:t>11/11/2013</a:t>
             </a:fld>
             <a:endParaRPr lang="en-US"/>
           </a:p>
@@ -1054,7 +1061,7 @@
           <a:p>
             <a:fld id="{12ACB943-4C8A-4DEC-8EFE-31A84E37E7F8}" type="datetimeFigureOut">
               <a:rPr lang="en-US" smtClean="0"/>
-              <a:t>11/10/2013</a:t>
+              <a:t>11/11/2013</a:t>
             </a:fld>
             <a:endParaRPr lang="en-US"/>
           </a:p>
@@ -1342,7 +1349,7 @@
           <a:p>
             <a:fld id="{12ACB943-4C8A-4DEC-8EFE-31A84E37E7F8}" type="datetimeFigureOut">
               <a:rPr lang="en-US" smtClean="0"/>
-              <a:t>11/10/2013</a:t>
+              <a:t>11/11/2013</a:t>
             </a:fld>
             <a:endParaRPr lang="en-US"/>
           </a:p>
@@ -1764,7 +1771,7 @@
           <a:p>
             <a:fld id="{12ACB943-4C8A-4DEC-8EFE-31A84E37E7F8}" type="datetimeFigureOut">
               <a:rPr lang="en-US" smtClean="0"/>
-              <a:t>11/10/2013</a:t>
+              <a:t>11/11/2013</a:t>
             </a:fld>
             <a:endParaRPr lang="en-US"/>
           </a:p>
@@ -1882,7 +1889,7 @@
           <a:p>
             <a:fld id="{12ACB943-4C8A-4DEC-8EFE-31A84E37E7F8}" type="datetimeFigureOut">
               <a:rPr lang="en-US" smtClean="0"/>
-              <a:t>11/10/2013</a:t>
+              <a:t>11/11/2013</a:t>
             </a:fld>
             <a:endParaRPr lang="en-US"/>
           </a:p>
@@ -1977,7 +1984,7 @@
           <a:p>
             <a:fld id="{12ACB943-4C8A-4DEC-8EFE-31A84E37E7F8}" type="datetimeFigureOut">
               <a:rPr lang="en-US" smtClean="0"/>
-              <a:t>11/10/2013</a:t>
+              <a:t>11/11/2013</a:t>
             </a:fld>
             <a:endParaRPr lang="en-US"/>
           </a:p>
@@ -2254,7 +2261,7 @@
           <a:p>
             <a:fld id="{12ACB943-4C8A-4DEC-8EFE-31A84E37E7F8}" type="datetimeFigureOut">
               <a:rPr lang="en-US" smtClean="0"/>
-              <a:t>11/10/2013</a:t>
+              <a:t>11/11/2013</a:t>
             </a:fld>
             <a:endParaRPr lang="en-US"/>
           </a:p>
@@ -2507,7 +2514,7 @@
           <a:p>
             <a:fld id="{12ACB943-4C8A-4DEC-8EFE-31A84E37E7F8}" type="datetimeFigureOut">
               <a:rPr lang="en-US" smtClean="0"/>
-              <a:t>11/10/2013</a:t>
+              <a:t>11/11/2013</a:t>
             </a:fld>
             <a:endParaRPr lang="en-US"/>
           </a:p>
@@ -2720,7 +2727,7 @@
           <a:p>
             <a:fld id="{12ACB943-4C8A-4DEC-8EFE-31A84E37E7F8}" type="datetimeFigureOut">
               <a:rPr lang="en-US" smtClean="0"/>
-              <a:t>11/10/2013</a:t>
+              <a:t>11/11/2013</a:t>
             </a:fld>
             <a:endParaRPr lang="en-US"/>
           </a:p>
@@ -3114,7 +3121,7 @@
           <a:p>
             <a:r>
               <a:rPr lang="en-US" i="1" dirty="0" smtClean="0"/>
-              <a:t>Requirement Number</a:t>
+              <a:t>RCL.PL.STR1</a:t>
             </a:r>
             <a:endParaRPr lang="en-US" i="1" dirty="0"/>
           </a:p>
@@ -3130,7 +3137,7 @@
             <p:ph idx="1"/>
             <p:extLst>
               <p:ext uri="{D42A27DB-BD31-4B8C-83A1-F6EECF244321}">
-                <p14:modId xmlns:p14="http://schemas.microsoft.com/office/powerpoint/2010/main" val="1483644448"/>
+                <p14:modId xmlns:p14="http://schemas.microsoft.com/office/powerpoint/2010/main" val="3439178081"/>
               </p:ext>
             </p:extLst>
           </p:nvPr>
@@ -3161,15 +3168,7 @@
                             <a:schemeClr val="bg1"/>
                           </a:solidFill>
                         </a:rPr>
-                        <a:t> RVM Requirement </a:t>
-                      </a:r>
-                      <a:r>
-                        <a:rPr lang="en-US" b="0" dirty="0" smtClean="0">
-                          <a:solidFill>
-                            <a:schemeClr val="bg1"/>
-                          </a:solidFill>
-                        </a:rPr>
-                        <a:t>Number</a:t>
+                        <a:t> RVM Requirement Number</a:t>
                       </a:r>
                       <a:endParaRPr lang="en-US" b="0" dirty="0">
                         <a:solidFill>
@@ -3233,7 +3232,7 @@
                             <a:schemeClr val="tx1"/>
                           </a:solidFill>
                         </a:rPr>
-                        <a:t>1   (Section 3.0)</a:t>
+                        <a:t>STR1</a:t>
                       </a:r>
                       <a:endParaRPr lang="en-US" b="1" dirty="0">
                         <a:solidFill>
@@ -3308,15 +3307,7 @@
                             <a:schemeClr val="bg1"/>
                           </a:solidFill>
                         </a:rPr>
-                        <a:t>Requirement </a:t>
-                      </a:r>
-                      <a:r>
-                        <a:rPr lang="en-US" b="0" baseline="0" dirty="0" smtClean="0">
-                          <a:solidFill>
-                            <a:schemeClr val="bg1"/>
-                          </a:solidFill>
-                        </a:rPr>
-                        <a:t>Wording</a:t>
+                        <a:t>Requirement Wording</a:t>
                       </a:r>
                       <a:endParaRPr lang="en-US" b="0" dirty="0">
                         <a:solidFill>
@@ -3380,23 +3371,7 @@
                             <a:schemeClr val="tx1"/>
                           </a:solidFill>
                         </a:rPr>
-                        <a:t>“</a:t>
-                      </a:r>
-                      <a:r>
-                        <a:rPr lang="en-US" b="1" i="1" dirty="0" smtClean="0">
-                          <a:solidFill>
-                            <a:schemeClr val="tx1"/>
-                          </a:solidFill>
-                        </a:rPr>
-                        <a:t>Word</a:t>
-                      </a:r>
-                      <a:r>
-                        <a:rPr lang="en-US" b="1" i="1" baseline="0" dirty="0" smtClean="0">
-                          <a:solidFill>
-                            <a:schemeClr val="tx1"/>
-                          </a:solidFill>
-                        </a:rPr>
-                        <a:t> for word Requirement”</a:t>
+                        <a:t>The total CubeSat volume shall not exceed 6U</a:t>
                       </a:r>
                       <a:endParaRPr lang="en-US" b="1" dirty="0">
                         <a:solidFill>
@@ -3527,31 +3502,7 @@
                             <a:schemeClr val="tx1"/>
                           </a:solidFill>
                         </a:rPr>
-                        <a:t>Test,</a:t>
-                      </a:r>
-                      <a:r>
-                        <a:rPr lang="en-US" b="1" i="1" baseline="0" dirty="0" smtClean="0">
-                          <a:solidFill>
-                            <a:schemeClr val="tx1"/>
-                          </a:solidFill>
-                        </a:rPr>
-                        <a:t> Analyze, Examine, </a:t>
-                      </a:r>
-                      <a:r>
-                        <a:rPr lang="en-US" b="1" i="0" baseline="0" dirty="0" smtClean="0">
-                          <a:solidFill>
-                            <a:schemeClr val="tx1"/>
-                          </a:solidFill>
-                        </a:rPr>
-                        <a:t>or</a:t>
-                      </a:r>
-                      <a:r>
-                        <a:rPr lang="en-US" b="1" i="1" baseline="0" dirty="0" smtClean="0">
-                          <a:solidFill>
-                            <a:schemeClr val="tx1"/>
-                          </a:solidFill>
-                        </a:rPr>
-                        <a:t> Demo</a:t>
+                        <a:t>Examine</a:t>
                       </a:r>
                       <a:endParaRPr lang="en-US" b="1" i="1" dirty="0">
                         <a:solidFill>
@@ -3619,6 +3570,550 @@
         <p:spPr>
           <a:xfrm>
             <a:off x="381000" y="3676471"/>
+            <a:ext cx="8305800" cy="1569660"/>
+          </a:xfrm>
+          <a:prstGeom prst="rect">
+            <a:avLst/>
+          </a:prstGeom>
+          <a:noFill/>
+        </p:spPr>
+        <p:txBody>
+          <a:bodyPr wrap="square" rtlCol="0">
+            <a:spAutoFit/>
+          </a:bodyPr>
+          <a:lstStyle/>
+          <a:p>
+            <a:r>
+              <a:rPr lang="en-US" sz="2400" b="1" i="1" dirty="0"/>
+              <a:t>M</a:t>
+            </a:r>
+            <a:r>
+              <a:rPr lang="en-US" sz="2400" b="1" i="1" dirty="0" smtClean="0"/>
+              <a:t>et </a:t>
+            </a:r>
+            <a:r>
+              <a:rPr lang="en-US" sz="2400" b="1" i="1" dirty="0"/>
+              <a:t>by verifying the maximum outer dimensions of the CubeSat system fall within those dictated by a 6U architecture (20 cm x 10 cm x 300 cm</a:t>
+            </a:r>
+            <a:r>
+              <a:rPr lang="en-US" sz="2400" b="1" i="1" dirty="0" smtClean="0"/>
+              <a:t>) and performing a fit check with the 6U deployer.</a:t>
+            </a:r>
+            <a:endParaRPr lang="en-US" sz="2400" b="1" i="1" dirty="0"/>
+          </a:p>
+        </p:txBody>
+      </p:sp>
+    </p:spTree>
+    <p:extLst>
+      <p:ext uri="{BB962C8B-B14F-4D97-AF65-F5344CB8AC3E}">
+        <p14:creationId xmlns:p14="http://schemas.microsoft.com/office/powerpoint/2010/main" val="2711901525"/>
+      </p:ext>
+    </p:extLst>
+  </p:cSld>
+  <p:clrMapOvr>
+    <a:masterClrMapping/>
+  </p:clrMapOvr>
+</p:sld>
+</file>
+
+<file path=ppt/slides/slide2.xml><?xml version="1.0" encoding="utf-8"?>
+<p:sld xmlns:a="http://schemas.openxmlformats.org/drawingml/2006/main" xmlns:r="http://schemas.openxmlformats.org/officeDocument/2006/relationships" xmlns:p="http://schemas.openxmlformats.org/presentationml/2006/main">
+  <p:cSld>
+    <p:spTree>
+      <p:nvGrpSpPr>
+        <p:cNvPr id="1" name=""/>
+        <p:cNvGrpSpPr/>
+        <p:nvPr/>
+      </p:nvGrpSpPr>
+      <p:grpSpPr>
+        <a:xfrm>
+          <a:off x="0" y="0"/>
+          <a:ext cx="0" cy="0"/>
+          <a:chOff x="0" y="0"/>
+          <a:chExt cx="0" cy="0"/>
+        </a:xfrm>
+      </p:grpSpPr>
+      <p:sp>
+        <p:nvSpPr>
+          <p:cNvPr id="5" name="Title 1"/>
+          <p:cNvSpPr>
+            <a:spLocks noGrp="1"/>
+          </p:cNvSpPr>
+          <p:nvPr>
+            <p:ph type="title"/>
+          </p:nvPr>
+        </p:nvSpPr>
+        <p:spPr>
+          <a:xfrm>
+            <a:off x="457200" y="274638"/>
+            <a:ext cx="8229600" cy="1143000"/>
+          </a:xfrm>
+        </p:spPr>
+        <p:txBody>
+          <a:bodyPr>
+            <a:normAutofit/>
+          </a:bodyPr>
+          <a:lstStyle/>
+          <a:p>
+            <a:r>
+              <a:rPr lang="en-US" i="1" dirty="0" smtClean="0"/>
+              <a:t>RCL.PL.STR2</a:t>
+            </a:r>
+            <a:endParaRPr lang="en-US" i="1" dirty="0"/>
+          </a:p>
+        </p:txBody>
+      </p:sp>
+      <p:graphicFrame>
+        <p:nvGraphicFramePr>
+          <p:cNvPr id="6" name="Content Placeholder 3"/>
+          <p:cNvGraphicFramePr>
+            <a:graphicFrameLocks noGrp="1"/>
+          </p:cNvGraphicFramePr>
+          <p:nvPr>
+            <p:ph idx="1"/>
+            <p:extLst>
+              <p:ext uri="{D42A27DB-BD31-4B8C-83A1-F6EECF244321}">
+                <p14:modId xmlns:p14="http://schemas.microsoft.com/office/powerpoint/2010/main" val="3603819765"/>
+              </p:ext>
+            </p:extLst>
+          </p:nvPr>
+        </p:nvGraphicFramePr>
+        <p:xfrm>
+          <a:off x="457200" y="1371600"/>
+          <a:ext cx="8229600" cy="1112520"/>
+        </p:xfrm>
+        <a:graphic>
+          <a:graphicData uri="http://schemas.openxmlformats.org/drawingml/2006/table">
+            <a:tbl>
+              <a:tblPr firstRow="1" bandRow="1">
+                <a:tableStyleId>{5C22544A-7EE6-4342-B048-85BDC9FD1C3A}</a:tableStyleId>
+              </a:tblPr>
+              <a:tblGrid>
+                <a:gridCol w="3200400"/>
+                <a:gridCol w="5029200"/>
+              </a:tblGrid>
+              <a:tr h="370840">
+                <a:tc>
+                  <a:txBody>
+                    <a:bodyPr/>
+                    <a:lstStyle/>
+                    <a:p>
+                      <a:r>
+                        <a:rPr lang="en-US" b="0" dirty="0" smtClean="0">
+                          <a:solidFill>
+                            <a:schemeClr val="bg1"/>
+                          </a:solidFill>
+                        </a:rPr>
+                        <a:t> RVM Requirement Number</a:t>
+                      </a:r>
+                      <a:endParaRPr lang="en-US" b="0" dirty="0">
+                        <a:solidFill>
+                          <a:schemeClr val="bg1"/>
+                        </a:solidFill>
+                      </a:endParaRPr>
+                    </a:p>
+                  </a:txBody>
+                  <a:tcPr anchor="ctr">
+                    <a:lnL w="12700" cap="flat" cmpd="sng" algn="ctr">
+                      <a:solidFill>
+                        <a:schemeClr val="tx1"/>
+                      </a:solidFill>
+                      <a:prstDash val="solid"/>
+                      <a:round/>
+                      <a:headEnd type="none" w="med" len="med"/>
+                      <a:tailEnd type="none" w="med" len="med"/>
+                    </a:lnL>
+                    <a:lnR w="12700" cap="flat" cmpd="sng" algn="ctr">
+                      <a:solidFill>
+                        <a:schemeClr val="tx1"/>
+                      </a:solidFill>
+                      <a:prstDash val="solid"/>
+                      <a:round/>
+                      <a:headEnd type="none" w="med" len="med"/>
+                      <a:tailEnd type="none" w="med" len="med"/>
+                    </a:lnR>
+                    <a:lnT w="12700" cap="flat" cmpd="sng" algn="ctr">
+                      <a:solidFill>
+                        <a:schemeClr val="tx1"/>
+                      </a:solidFill>
+                      <a:prstDash val="solid"/>
+                      <a:round/>
+                      <a:headEnd type="none" w="med" len="med"/>
+                      <a:tailEnd type="none" w="med" len="med"/>
+                    </a:lnT>
+                    <a:lnB w="12700" cap="flat" cmpd="sng" algn="ctr">
+                      <a:solidFill>
+                        <a:schemeClr val="tx1"/>
+                      </a:solidFill>
+                      <a:prstDash val="solid"/>
+                      <a:round/>
+                      <a:headEnd type="none" w="med" len="med"/>
+                      <a:tailEnd type="none" w="med" len="med"/>
+                    </a:lnB>
+                    <a:solidFill>
+                      <a:schemeClr val="tx2">
+                        <a:lumMod val="75000"/>
+                      </a:schemeClr>
+                    </a:solidFill>
+                  </a:tcPr>
+                </a:tc>
+                <a:tc>
+                  <a:txBody>
+                    <a:bodyPr/>
+                    <a:lstStyle/>
+                    <a:p>
+                      <a:r>
+                        <a:rPr lang="en-US" b="1" dirty="0" smtClean="0">
+                          <a:solidFill>
+                            <a:schemeClr val="tx1"/>
+                          </a:solidFill>
+                        </a:rPr>
+                        <a:t>STR2</a:t>
+                      </a:r>
+                      <a:endParaRPr lang="en-US" b="1" dirty="0">
+                        <a:solidFill>
+                          <a:schemeClr val="tx1"/>
+                        </a:solidFill>
+                      </a:endParaRPr>
+                    </a:p>
+                  </a:txBody>
+                  <a:tcPr>
+                    <a:lnL w="12700" cap="flat" cmpd="sng" algn="ctr">
+                      <a:solidFill>
+                        <a:schemeClr val="tx1"/>
+                      </a:solidFill>
+                      <a:prstDash val="solid"/>
+                      <a:round/>
+                      <a:headEnd type="none" w="med" len="med"/>
+                      <a:tailEnd type="none" w="med" len="med"/>
+                    </a:lnL>
+                    <a:lnR w="12700" cap="flat" cmpd="sng" algn="ctr">
+                      <a:solidFill>
+                        <a:schemeClr val="tx1"/>
+                      </a:solidFill>
+                      <a:prstDash val="solid"/>
+                      <a:round/>
+                      <a:headEnd type="none" w="med" len="med"/>
+                      <a:tailEnd type="none" w="med" len="med"/>
+                    </a:lnR>
+                    <a:lnT w="12700" cap="flat" cmpd="sng" algn="ctr">
+                      <a:solidFill>
+                        <a:schemeClr val="tx1"/>
+                      </a:solidFill>
+                      <a:prstDash val="solid"/>
+                      <a:round/>
+                      <a:headEnd type="none" w="med" len="med"/>
+                      <a:tailEnd type="none" w="med" len="med"/>
+                    </a:lnT>
+                    <a:lnB w="12700" cap="flat" cmpd="sng" algn="ctr">
+                      <a:solidFill>
+                        <a:schemeClr val="tx1"/>
+                      </a:solidFill>
+                      <a:prstDash val="solid"/>
+                      <a:round/>
+                      <a:headEnd type="none" w="med" len="med"/>
+                      <a:tailEnd type="none" w="med" len="med"/>
+                    </a:lnB>
+                    <a:solidFill>
+                      <a:schemeClr val="tx2">
+                        <a:lumMod val="40000"/>
+                        <a:lumOff val="60000"/>
+                      </a:schemeClr>
+                    </a:solidFill>
+                  </a:tcPr>
+                </a:tc>
+              </a:tr>
+              <a:tr h="370840">
+                <a:tc>
+                  <a:txBody>
+                    <a:bodyPr/>
+                    <a:lstStyle/>
+                    <a:p>
+                      <a:r>
+                        <a:rPr lang="en-US" b="0" dirty="0" smtClean="0">
+                          <a:solidFill>
+                            <a:schemeClr val="bg1"/>
+                          </a:solidFill>
+                        </a:rPr>
+                        <a:t>RVM </a:t>
+                      </a:r>
+                      <a:r>
+                        <a:rPr lang="en-US" b="0" baseline="0" dirty="0" smtClean="0">
+                          <a:solidFill>
+                            <a:schemeClr val="bg1"/>
+                          </a:solidFill>
+                        </a:rPr>
+                        <a:t>Requirement Wording</a:t>
+                      </a:r>
+                      <a:endParaRPr lang="en-US" b="0" dirty="0">
+                        <a:solidFill>
+                          <a:schemeClr val="bg1"/>
+                        </a:solidFill>
+                      </a:endParaRPr>
+                    </a:p>
+                  </a:txBody>
+                  <a:tcPr anchor="ctr">
+                    <a:lnL w="12700" cap="flat" cmpd="sng" algn="ctr">
+                      <a:solidFill>
+                        <a:schemeClr val="tx1"/>
+                      </a:solidFill>
+                      <a:prstDash val="solid"/>
+                      <a:round/>
+                      <a:headEnd type="none" w="med" len="med"/>
+                      <a:tailEnd type="none" w="med" len="med"/>
+                    </a:lnL>
+                    <a:lnR w="12700" cap="flat" cmpd="sng" algn="ctr">
+                      <a:solidFill>
+                        <a:schemeClr val="tx1"/>
+                      </a:solidFill>
+                      <a:prstDash val="solid"/>
+                      <a:round/>
+                      <a:headEnd type="none" w="med" len="med"/>
+                      <a:tailEnd type="none" w="med" len="med"/>
+                    </a:lnR>
+                    <a:lnT w="12700" cap="flat" cmpd="sng" algn="ctr">
+                      <a:solidFill>
+                        <a:schemeClr val="tx1"/>
+                      </a:solidFill>
+                      <a:prstDash val="solid"/>
+                      <a:round/>
+                      <a:headEnd type="none" w="med" len="med"/>
+                      <a:tailEnd type="none" w="med" len="med"/>
+                    </a:lnT>
+                    <a:lnB w="12700" cap="flat" cmpd="sng" algn="ctr">
+                      <a:solidFill>
+                        <a:schemeClr val="tx1"/>
+                      </a:solidFill>
+                      <a:prstDash val="solid"/>
+                      <a:round/>
+                      <a:headEnd type="none" w="med" len="med"/>
+                      <a:tailEnd type="none" w="med" len="med"/>
+                    </a:lnB>
+                    <a:solidFill>
+                      <a:schemeClr val="tx2">
+                        <a:lumMod val="75000"/>
+                      </a:schemeClr>
+                    </a:solidFill>
+                  </a:tcPr>
+                </a:tc>
+                <a:tc>
+                  <a:txBody>
+                    <a:bodyPr/>
+                    <a:lstStyle/>
+                    <a:p>
+                      <a:r>
+                        <a:rPr lang="en-US" b="1" dirty="0" smtClean="0">
+                          <a:solidFill>
+                            <a:schemeClr val="tx1"/>
+                          </a:solidFill>
+                        </a:rPr>
+                        <a:t>The total CubeSat</a:t>
+                      </a:r>
+                      <a:r>
+                        <a:rPr lang="en-US" b="1" baseline="0" dirty="0" smtClean="0">
+                          <a:solidFill>
+                            <a:schemeClr val="tx1"/>
+                          </a:solidFill>
+                        </a:rPr>
+                        <a:t> mass shall not exceed 8.0 kg</a:t>
+                      </a:r>
+                      <a:endParaRPr lang="en-US" b="1" dirty="0">
+                        <a:solidFill>
+                          <a:schemeClr val="tx1"/>
+                        </a:solidFill>
+                      </a:endParaRPr>
+                    </a:p>
+                  </a:txBody>
+                  <a:tcPr>
+                    <a:lnL w="12700" cap="flat" cmpd="sng" algn="ctr">
+                      <a:solidFill>
+                        <a:schemeClr val="tx1"/>
+                      </a:solidFill>
+                      <a:prstDash val="solid"/>
+                      <a:round/>
+                      <a:headEnd type="none" w="med" len="med"/>
+                      <a:tailEnd type="none" w="med" len="med"/>
+                    </a:lnL>
+                    <a:lnR w="12700" cap="flat" cmpd="sng" algn="ctr">
+                      <a:solidFill>
+                        <a:schemeClr val="tx1"/>
+                      </a:solidFill>
+                      <a:prstDash val="solid"/>
+                      <a:round/>
+                      <a:headEnd type="none" w="med" len="med"/>
+                      <a:tailEnd type="none" w="med" len="med"/>
+                    </a:lnR>
+                    <a:lnT w="12700" cap="flat" cmpd="sng" algn="ctr">
+                      <a:solidFill>
+                        <a:schemeClr val="tx1"/>
+                      </a:solidFill>
+                      <a:prstDash val="solid"/>
+                      <a:round/>
+                      <a:headEnd type="none" w="med" len="med"/>
+                      <a:tailEnd type="none" w="med" len="med"/>
+                    </a:lnT>
+                    <a:lnB w="12700" cap="flat" cmpd="sng" algn="ctr">
+                      <a:solidFill>
+                        <a:schemeClr val="tx1"/>
+                      </a:solidFill>
+                      <a:prstDash val="solid"/>
+                      <a:round/>
+                      <a:headEnd type="none" w="med" len="med"/>
+                      <a:tailEnd type="none" w="med" len="med"/>
+                    </a:lnB>
+                    <a:solidFill>
+                      <a:schemeClr val="tx2">
+                        <a:lumMod val="40000"/>
+                        <a:lumOff val="60000"/>
+                      </a:schemeClr>
+                    </a:solidFill>
+                  </a:tcPr>
+                </a:tc>
+              </a:tr>
+              <a:tr h="370840">
+                <a:tc>
+                  <a:txBody>
+                    <a:bodyPr/>
+                    <a:lstStyle/>
+                    <a:p>
+                      <a:r>
+                        <a:rPr lang="en-US" b="0" dirty="0" smtClean="0">
+                          <a:solidFill>
+                            <a:schemeClr val="bg1"/>
+                          </a:solidFill>
+                        </a:rPr>
+                        <a:t>Validation Method</a:t>
+                      </a:r>
+                      <a:endParaRPr lang="en-US" b="0" dirty="0">
+                        <a:solidFill>
+                          <a:schemeClr val="bg1"/>
+                        </a:solidFill>
+                      </a:endParaRPr>
+                    </a:p>
+                  </a:txBody>
+                  <a:tcPr anchor="ctr">
+                    <a:lnL w="12700" cap="flat" cmpd="sng" algn="ctr">
+                      <a:solidFill>
+                        <a:schemeClr val="tx1"/>
+                      </a:solidFill>
+                      <a:prstDash val="solid"/>
+                      <a:round/>
+                      <a:headEnd type="none" w="med" len="med"/>
+                      <a:tailEnd type="none" w="med" len="med"/>
+                    </a:lnL>
+                    <a:lnR w="12700" cap="flat" cmpd="sng" algn="ctr">
+                      <a:solidFill>
+                        <a:schemeClr val="tx1"/>
+                      </a:solidFill>
+                      <a:prstDash val="solid"/>
+                      <a:round/>
+                      <a:headEnd type="none" w="med" len="med"/>
+                      <a:tailEnd type="none" w="med" len="med"/>
+                    </a:lnR>
+                    <a:lnT w="12700" cap="flat" cmpd="sng" algn="ctr">
+                      <a:solidFill>
+                        <a:schemeClr val="tx1"/>
+                      </a:solidFill>
+                      <a:prstDash val="solid"/>
+                      <a:round/>
+                      <a:headEnd type="none" w="med" len="med"/>
+                      <a:tailEnd type="none" w="med" len="med"/>
+                    </a:lnT>
+                    <a:lnB w="12700" cap="flat" cmpd="sng" algn="ctr">
+                      <a:solidFill>
+                        <a:schemeClr val="tx1"/>
+                      </a:solidFill>
+                      <a:prstDash val="solid"/>
+                      <a:round/>
+                      <a:headEnd type="none" w="med" len="med"/>
+                      <a:tailEnd type="none" w="med" len="med"/>
+                    </a:lnB>
+                    <a:solidFill>
+                      <a:schemeClr val="tx2">
+                        <a:lumMod val="75000"/>
+                      </a:schemeClr>
+                    </a:solidFill>
+                  </a:tcPr>
+                </a:tc>
+                <a:tc>
+                  <a:txBody>
+                    <a:bodyPr/>
+                    <a:lstStyle/>
+                    <a:p>
+                      <a:r>
+                        <a:rPr lang="en-US" b="1" i="1" dirty="0" smtClean="0">
+                          <a:solidFill>
+                            <a:schemeClr val="tx1"/>
+                          </a:solidFill>
+                        </a:rPr>
+                        <a:t>Examine</a:t>
+                      </a:r>
+                      <a:endParaRPr lang="en-US" b="1" i="1" dirty="0">
+                        <a:solidFill>
+                          <a:schemeClr val="tx1"/>
+                        </a:solidFill>
+                      </a:endParaRPr>
+                    </a:p>
+                  </a:txBody>
+                  <a:tcPr>
+                    <a:lnL w="12700" cap="flat" cmpd="sng" algn="ctr">
+                      <a:solidFill>
+                        <a:schemeClr val="tx1"/>
+                      </a:solidFill>
+                      <a:prstDash val="solid"/>
+                      <a:round/>
+                      <a:headEnd type="none" w="med" len="med"/>
+                      <a:tailEnd type="none" w="med" len="med"/>
+                    </a:lnL>
+                    <a:lnR w="12700" cap="flat" cmpd="sng" algn="ctr">
+                      <a:solidFill>
+                        <a:schemeClr val="tx1"/>
+                      </a:solidFill>
+                      <a:prstDash val="solid"/>
+                      <a:round/>
+                      <a:headEnd type="none" w="med" len="med"/>
+                      <a:tailEnd type="none" w="med" len="med"/>
+                    </a:lnR>
+                    <a:lnT w="12700" cap="flat" cmpd="sng" algn="ctr">
+                      <a:solidFill>
+                        <a:schemeClr val="tx1"/>
+                      </a:solidFill>
+                      <a:prstDash val="solid"/>
+                      <a:round/>
+                      <a:headEnd type="none" w="med" len="med"/>
+                      <a:tailEnd type="none" w="med" len="med"/>
+                    </a:lnT>
+                    <a:lnB w="12700" cap="flat" cmpd="sng" algn="ctr">
+                      <a:solidFill>
+                        <a:schemeClr val="tx1"/>
+                      </a:solidFill>
+                      <a:prstDash val="solid"/>
+                      <a:round/>
+                      <a:headEnd type="none" w="med" len="med"/>
+                      <a:tailEnd type="none" w="med" len="med"/>
+                    </a:lnB>
+                    <a:solidFill>
+                      <a:schemeClr val="tx2">
+                        <a:lumMod val="40000"/>
+                        <a:lumOff val="60000"/>
+                      </a:schemeClr>
+                    </a:solidFill>
+                  </a:tcPr>
+                </a:tc>
+              </a:tr>
+            </a:tbl>
+          </a:graphicData>
+        </a:graphic>
+      </p:graphicFrame>
+      <p:sp>
+        <p:nvSpPr>
+          <p:cNvPr id="7" name="TextBox 6"/>
+          <p:cNvSpPr txBox="1"/>
+          <p:nvPr/>
+        </p:nvSpPr>
+        <p:spPr>
+          <a:xfrm>
+            <a:off x="381000" y="3676471"/>
             <a:ext cx="8305800" cy="830997"/>
           </a:xfrm>
           <a:prstGeom prst="rect">
@@ -3634,7 +4129,7 @@
           <a:p>
             <a:r>
               <a:rPr lang="en-US" sz="2400" b="1" i="1" dirty="0" smtClean="0"/>
-              <a:t>Sentence summary of any terms that need explaining. Also include images, where necessary</a:t>
+              <a:t>Met by weighing the integrated spacecraft prior to launch vehicle integration.</a:t>
             </a:r>
             <a:endParaRPr lang="en-US" sz="2400" b="1" i="1" dirty="0"/>
           </a:p>
@@ -3643,7 +4138,3186 @@
     </p:spTree>
     <p:extLst>
       <p:ext uri="{BB962C8B-B14F-4D97-AF65-F5344CB8AC3E}">
-        <p14:creationId xmlns:p14="http://schemas.microsoft.com/office/powerpoint/2010/main" val="2711901525"/>
+        <p14:creationId xmlns:p14="http://schemas.microsoft.com/office/powerpoint/2010/main" val="3723488692"/>
+      </p:ext>
+    </p:extLst>
+  </p:cSld>
+  <p:clrMapOvr>
+    <a:masterClrMapping/>
+  </p:clrMapOvr>
+</p:sld>
+</file>
+
+<file path=ppt/slides/slide3.xml><?xml version="1.0" encoding="utf-8"?>
+<p:sld xmlns:a="http://schemas.openxmlformats.org/drawingml/2006/main" xmlns:r="http://schemas.openxmlformats.org/officeDocument/2006/relationships" xmlns:p="http://schemas.openxmlformats.org/presentationml/2006/main">
+  <p:cSld>
+    <p:spTree>
+      <p:nvGrpSpPr>
+        <p:cNvPr id="1" name=""/>
+        <p:cNvGrpSpPr/>
+        <p:nvPr/>
+      </p:nvGrpSpPr>
+      <p:grpSpPr>
+        <a:xfrm>
+          <a:off x="0" y="0"/>
+          <a:ext cx="0" cy="0"/>
+          <a:chOff x="0" y="0"/>
+          <a:chExt cx="0" cy="0"/>
+        </a:xfrm>
+      </p:grpSpPr>
+      <p:sp>
+        <p:nvSpPr>
+          <p:cNvPr id="5" name="Title 1"/>
+          <p:cNvSpPr>
+            <a:spLocks noGrp="1"/>
+          </p:cNvSpPr>
+          <p:nvPr>
+            <p:ph type="title"/>
+          </p:nvPr>
+        </p:nvSpPr>
+        <p:spPr>
+          <a:xfrm>
+            <a:off x="457200" y="274638"/>
+            <a:ext cx="8229600" cy="1143000"/>
+          </a:xfrm>
+        </p:spPr>
+        <p:txBody>
+          <a:bodyPr>
+            <a:normAutofit/>
+          </a:bodyPr>
+          <a:lstStyle/>
+          <a:p>
+            <a:r>
+              <a:rPr lang="en-US" i="1" dirty="0" smtClean="0"/>
+              <a:t>RCL.PL.STR3</a:t>
+            </a:r>
+            <a:endParaRPr lang="en-US" i="1" dirty="0"/>
+          </a:p>
+        </p:txBody>
+      </p:sp>
+      <p:graphicFrame>
+        <p:nvGraphicFramePr>
+          <p:cNvPr id="6" name="Content Placeholder 3"/>
+          <p:cNvGraphicFramePr>
+            <a:graphicFrameLocks noGrp="1"/>
+          </p:cNvGraphicFramePr>
+          <p:nvPr>
+            <p:ph idx="1"/>
+            <p:extLst>
+              <p:ext uri="{D42A27DB-BD31-4B8C-83A1-F6EECF244321}">
+                <p14:modId xmlns:p14="http://schemas.microsoft.com/office/powerpoint/2010/main" val="1053268969"/>
+              </p:ext>
+            </p:extLst>
+          </p:nvPr>
+        </p:nvGraphicFramePr>
+        <p:xfrm>
+          <a:off x="457200" y="1371600"/>
+          <a:ext cx="8229600" cy="1381760"/>
+        </p:xfrm>
+        <a:graphic>
+          <a:graphicData uri="http://schemas.openxmlformats.org/drawingml/2006/table">
+            <a:tbl>
+              <a:tblPr firstRow="1" bandRow="1">
+                <a:tableStyleId>{5C22544A-7EE6-4342-B048-85BDC9FD1C3A}</a:tableStyleId>
+              </a:tblPr>
+              <a:tblGrid>
+                <a:gridCol w="3200400"/>
+                <a:gridCol w="5029200"/>
+              </a:tblGrid>
+              <a:tr h="370840">
+                <a:tc>
+                  <a:txBody>
+                    <a:bodyPr/>
+                    <a:lstStyle/>
+                    <a:p>
+                      <a:r>
+                        <a:rPr lang="en-US" b="0" dirty="0" smtClean="0">
+                          <a:solidFill>
+                            <a:schemeClr val="bg1"/>
+                          </a:solidFill>
+                        </a:rPr>
+                        <a:t> RVM Requirement Number</a:t>
+                      </a:r>
+                      <a:endParaRPr lang="en-US" b="0" dirty="0">
+                        <a:solidFill>
+                          <a:schemeClr val="bg1"/>
+                        </a:solidFill>
+                      </a:endParaRPr>
+                    </a:p>
+                  </a:txBody>
+                  <a:tcPr anchor="ctr">
+                    <a:lnL w="12700" cap="flat" cmpd="sng" algn="ctr">
+                      <a:solidFill>
+                        <a:schemeClr val="tx1"/>
+                      </a:solidFill>
+                      <a:prstDash val="solid"/>
+                      <a:round/>
+                      <a:headEnd type="none" w="med" len="med"/>
+                      <a:tailEnd type="none" w="med" len="med"/>
+                    </a:lnL>
+                    <a:lnR w="12700" cap="flat" cmpd="sng" algn="ctr">
+                      <a:solidFill>
+                        <a:schemeClr val="tx1"/>
+                      </a:solidFill>
+                      <a:prstDash val="solid"/>
+                      <a:round/>
+                      <a:headEnd type="none" w="med" len="med"/>
+                      <a:tailEnd type="none" w="med" len="med"/>
+                    </a:lnR>
+                    <a:lnT w="12700" cap="flat" cmpd="sng" algn="ctr">
+                      <a:solidFill>
+                        <a:schemeClr val="tx1"/>
+                      </a:solidFill>
+                      <a:prstDash val="solid"/>
+                      <a:round/>
+                      <a:headEnd type="none" w="med" len="med"/>
+                      <a:tailEnd type="none" w="med" len="med"/>
+                    </a:lnT>
+                    <a:lnB w="12700" cap="flat" cmpd="sng" algn="ctr">
+                      <a:solidFill>
+                        <a:schemeClr val="tx1"/>
+                      </a:solidFill>
+                      <a:prstDash val="solid"/>
+                      <a:round/>
+                      <a:headEnd type="none" w="med" len="med"/>
+                      <a:tailEnd type="none" w="med" len="med"/>
+                    </a:lnB>
+                    <a:solidFill>
+                      <a:schemeClr val="tx2">
+                        <a:lumMod val="75000"/>
+                      </a:schemeClr>
+                    </a:solidFill>
+                  </a:tcPr>
+                </a:tc>
+                <a:tc>
+                  <a:txBody>
+                    <a:bodyPr/>
+                    <a:lstStyle/>
+                    <a:p>
+                      <a:r>
+                        <a:rPr lang="en-US" b="1" dirty="0" smtClean="0">
+                          <a:solidFill>
+                            <a:schemeClr val="tx1"/>
+                          </a:solidFill>
+                        </a:rPr>
+                        <a:t>STR3</a:t>
+                      </a:r>
+                      <a:endParaRPr lang="en-US" b="1" dirty="0">
+                        <a:solidFill>
+                          <a:schemeClr val="tx1"/>
+                        </a:solidFill>
+                      </a:endParaRPr>
+                    </a:p>
+                  </a:txBody>
+                  <a:tcPr>
+                    <a:lnL w="12700" cap="flat" cmpd="sng" algn="ctr">
+                      <a:solidFill>
+                        <a:schemeClr val="tx1"/>
+                      </a:solidFill>
+                      <a:prstDash val="solid"/>
+                      <a:round/>
+                      <a:headEnd type="none" w="med" len="med"/>
+                      <a:tailEnd type="none" w="med" len="med"/>
+                    </a:lnL>
+                    <a:lnR w="12700" cap="flat" cmpd="sng" algn="ctr">
+                      <a:solidFill>
+                        <a:schemeClr val="tx1"/>
+                      </a:solidFill>
+                      <a:prstDash val="solid"/>
+                      <a:round/>
+                      <a:headEnd type="none" w="med" len="med"/>
+                      <a:tailEnd type="none" w="med" len="med"/>
+                    </a:lnR>
+                    <a:lnT w="12700" cap="flat" cmpd="sng" algn="ctr">
+                      <a:solidFill>
+                        <a:schemeClr val="tx1"/>
+                      </a:solidFill>
+                      <a:prstDash val="solid"/>
+                      <a:round/>
+                      <a:headEnd type="none" w="med" len="med"/>
+                      <a:tailEnd type="none" w="med" len="med"/>
+                    </a:lnT>
+                    <a:lnB w="12700" cap="flat" cmpd="sng" algn="ctr">
+                      <a:solidFill>
+                        <a:schemeClr val="tx1"/>
+                      </a:solidFill>
+                      <a:prstDash val="solid"/>
+                      <a:round/>
+                      <a:headEnd type="none" w="med" len="med"/>
+                      <a:tailEnd type="none" w="med" len="med"/>
+                    </a:lnB>
+                    <a:solidFill>
+                      <a:schemeClr val="tx2">
+                        <a:lumMod val="40000"/>
+                        <a:lumOff val="60000"/>
+                      </a:schemeClr>
+                    </a:solidFill>
+                  </a:tcPr>
+                </a:tc>
+              </a:tr>
+              <a:tr h="370840">
+                <a:tc>
+                  <a:txBody>
+                    <a:bodyPr/>
+                    <a:lstStyle/>
+                    <a:p>
+                      <a:r>
+                        <a:rPr lang="en-US" b="0" dirty="0" smtClean="0">
+                          <a:solidFill>
+                            <a:schemeClr val="bg1"/>
+                          </a:solidFill>
+                        </a:rPr>
+                        <a:t>RVM </a:t>
+                      </a:r>
+                      <a:r>
+                        <a:rPr lang="en-US" b="0" baseline="0" dirty="0" smtClean="0">
+                          <a:solidFill>
+                            <a:schemeClr val="bg1"/>
+                          </a:solidFill>
+                        </a:rPr>
+                        <a:t>Requirement Wording</a:t>
+                      </a:r>
+                      <a:endParaRPr lang="en-US" b="0" dirty="0">
+                        <a:solidFill>
+                          <a:schemeClr val="bg1"/>
+                        </a:solidFill>
+                      </a:endParaRPr>
+                    </a:p>
+                  </a:txBody>
+                  <a:tcPr anchor="ctr">
+                    <a:lnL w="12700" cap="flat" cmpd="sng" algn="ctr">
+                      <a:solidFill>
+                        <a:schemeClr val="tx1"/>
+                      </a:solidFill>
+                      <a:prstDash val="solid"/>
+                      <a:round/>
+                      <a:headEnd type="none" w="med" len="med"/>
+                      <a:tailEnd type="none" w="med" len="med"/>
+                    </a:lnL>
+                    <a:lnR w="12700" cap="flat" cmpd="sng" algn="ctr">
+                      <a:solidFill>
+                        <a:schemeClr val="tx1"/>
+                      </a:solidFill>
+                      <a:prstDash val="solid"/>
+                      <a:round/>
+                      <a:headEnd type="none" w="med" len="med"/>
+                      <a:tailEnd type="none" w="med" len="med"/>
+                    </a:lnR>
+                    <a:lnT w="12700" cap="flat" cmpd="sng" algn="ctr">
+                      <a:solidFill>
+                        <a:schemeClr val="tx1"/>
+                      </a:solidFill>
+                      <a:prstDash val="solid"/>
+                      <a:round/>
+                      <a:headEnd type="none" w="med" len="med"/>
+                      <a:tailEnd type="none" w="med" len="med"/>
+                    </a:lnT>
+                    <a:lnB w="12700" cap="flat" cmpd="sng" algn="ctr">
+                      <a:solidFill>
+                        <a:schemeClr val="tx1"/>
+                      </a:solidFill>
+                      <a:prstDash val="solid"/>
+                      <a:round/>
+                      <a:headEnd type="none" w="med" len="med"/>
+                      <a:tailEnd type="none" w="med" len="med"/>
+                    </a:lnB>
+                    <a:solidFill>
+                      <a:schemeClr val="tx2">
+                        <a:lumMod val="75000"/>
+                      </a:schemeClr>
+                    </a:solidFill>
+                  </a:tcPr>
+                </a:tc>
+                <a:tc>
+                  <a:txBody>
+                    <a:bodyPr/>
+                    <a:lstStyle/>
+                    <a:p>
+                      <a:r>
+                        <a:rPr lang="en-US" b="1" dirty="0" smtClean="0">
+                          <a:solidFill>
+                            <a:schemeClr val="tx1"/>
+                          </a:solidFill>
+                        </a:rPr>
+                        <a:t>All materials used in the CubeSa</a:t>
+                      </a:r>
+                      <a:r>
+                        <a:rPr lang="en-US" b="1" baseline="0" dirty="0" smtClean="0">
+                          <a:solidFill>
+                            <a:schemeClr val="tx1"/>
+                          </a:solidFill>
+                        </a:rPr>
+                        <a:t>t shall have a Total Mass Loss of less than 1.0 %</a:t>
+                      </a:r>
+                      <a:endParaRPr lang="en-US" b="1" dirty="0">
+                        <a:solidFill>
+                          <a:schemeClr val="tx1"/>
+                        </a:solidFill>
+                      </a:endParaRPr>
+                    </a:p>
+                  </a:txBody>
+                  <a:tcPr>
+                    <a:lnL w="12700" cap="flat" cmpd="sng" algn="ctr">
+                      <a:solidFill>
+                        <a:schemeClr val="tx1"/>
+                      </a:solidFill>
+                      <a:prstDash val="solid"/>
+                      <a:round/>
+                      <a:headEnd type="none" w="med" len="med"/>
+                      <a:tailEnd type="none" w="med" len="med"/>
+                    </a:lnL>
+                    <a:lnR w="12700" cap="flat" cmpd="sng" algn="ctr">
+                      <a:solidFill>
+                        <a:schemeClr val="tx1"/>
+                      </a:solidFill>
+                      <a:prstDash val="solid"/>
+                      <a:round/>
+                      <a:headEnd type="none" w="med" len="med"/>
+                      <a:tailEnd type="none" w="med" len="med"/>
+                    </a:lnR>
+                    <a:lnT w="12700" cap="flat" cmpd="sng" algn="ctr">
+                      <a:solidFill>
+                        <a:schemeClr val="tx1"/>
+                      </a:solidFill>
+                      <a:prstDash val="solid"/>
+                      <a:round/>
+                      <a:headEnd type="none" w="med" len="med"/>
+                      <a:tailEnd type="none" w="med" len="med"/>
+                    </a:lnT>
+                    <a:lnB w="12700" cap="flat" cmpd="sng" algn="ctr">
+                      <a:solidFill>
+                        <a:schemeClr val="tx1"/>
+                      </a:solidFill>
+                      <a:prstDash val="solid"/>
+                      <a:round/>
+                      <a:headEnd type="none" w="med" len="med"/>
+                      <a:tailEnd type="none" w="med" len="med"/>
+                    </a:lnB>
+                    <a:solidFill>
+                      <a:schemeClr val="tx2">
+                        <a:lumMod val="40000"/>
+                        <a:lumOff val="60000"/>
+                      </a:schemeClr>
+                    </a:solidFill>
+                  </a:tcPr>
+                </a:tc>
+              </a:tr>
+              <a:tr h="370840">
+                <a:tc>
+                  <a:txBody>
+                    <a:bodyPr/>
+                    <a:lstStyle/>
+                    <a:p>
+                      <a:r>
+                        <a:rPr lang="en-US" b="0" dirty="0" smtClean="0">
+                          <a:solidFill>
+                            <a:schemeClr val="bg1"/>
+                          </a:solidFill>
+                        </a:rPr>
+                        <a:t>Validation Method</a:t>
+                      </a:r>
+                      <a:endParaRPr lang="en-US" b="0" dirty="0">
+                        <a:solidFill>
+                          <a:schemeClr val="bg1"/>
+                        </a:solidFill>
+                      </a:endParaRPr>
+                    </a:p>
+                  </a:txBody>
+                  <a:tcPr anchor="ctr">
+                    <a:lnL w="12700" cap="flat" cmpd="sng" algn="ctr">
+                      <a:solidFill>
+                        <a:schemeClr val="tx1"/>
+                      </a:solidFill>
+                      <a:prstDash val="solid"/>
+                      <a:round/>
+                      <a:headEnd type="none" w="med" len="med"/>
+                      <a:tailEnd type="none" w="med" len="med"/>
+                    </a:lnL>
+                    <a:lnR w="12700" cap="flat" cmpd="sng" algn="ctr">
+                      <a:solidFill>
+                        <a:schemeClr val="tx1"/>
+                      </a:solidFill>
+                      <a:prstDash val="solid"/>
+                      <a:round/>
+                      <a:headEnd type="none" w="med" len="med"/>
+                      <a:tailEnd type="none" w="med" len="med"/>
+                    </a:lnR>
+                    <a:lnT w="12700" cap="flat" cmpd="sng" algn="ctr">
+                      <a:solidFill>
+                        <a:schemeClr val="tx1"/>
+                      </a:solidFill>
+                      <a:prstDash val="solid"/>
+                      <a:round/>
+                      <a:headEnd type="none" w="med" len="med"/>
+                      <a:tailEnd type="none" w="med" len="med"/>
+                    </a:lnT>
+                    <a:lnB w="12700" cap="flat" cmpd="sng" algn="ctr">
+                      <a:solidFill>
+                        <a:schemeClr val="tx1"/>
+                      </a:solidFill>
+                      <a:prstDash val="solid"/>
+                      <a:round/>
+                      <a:headEnd type="none" w="med" len="med"/>
+                      <a:tailEnd type="none" w="med" len="med"/>
+                    </a:lnB>
+                    <a:solidFill>
+                      <a:schemeClr val="tx2">
+                        <a:lumMod val="75000"/>
+                      </a:schemeClr>
+                    </a:solidFill>
+                  </a:tcPr>
+                </a:tc>
+                <a:tc>
+                  <a:txBody>
+                    <a:bodyPr/>
+                    <a:lstStyle/>
+                    <a:p>
+                      <a:r>
+                        <a:rPr lang="en-US" b="1" i="1" dirty="0" smtClean="0">
+                          <a:solidFill>
+                            <a:schemeClr val="tx1"/>
+                          </a:solidFill>
+                        </a:rPr>
+                        <a:t>Analysis</a:t>
+                      </a:r>
+                      <a:endParaRPr lang="en-US" b="1" i="1" dirty="0">
+                        <a:solidFill>
+                          <a:schemeClr val="tx1"/>
+                        </a:solidFill>
+                      </a:endParaRPr>
+                    </a:p>
+                  </a:txBody>
+                  <a:tcPr>
+                    <a:lnL w="12700" cap="flat" cmpd="sng" algn="ctr">
+                      <a:solidFill>
+                        <a:schemeClr val="tx1"/>
+                      </a:solidFill>
+                      <a:prstDash val="solid"/>
+                      <a:round/>
+                      <a:headEnd type="none" w="med" len="med"/>
+                      <a:tailEnd type="none" w="med" len="med"/>
+                    </a:lnL>
+                    <a:lnR w="12700" cap="flat" cmpd="sng" algn="ctr">
+                      <a:solidFill>
+                        <a:schemeClr val="tx1"/>
+                      </a:solidFill>
+                      <a:prstDash val="solid"/>
+                      <a:round/>
+                      <a:headEnd type="none" w="med" len="med"/>
+                      <a:tailEnd type="none" w="med" len="med"/>
+                    </a:lnR>
+                    <a:lnT w="12700" cap="flat" cmpd="sng" algn="ctr">
+                      <a:solidFill>
+                        <a:schemeClr val="tx1"/>
+                      </a:solidFill>
+                      <a:prstDash val="solid"/>
+                      <a:round/>
+                      <a:headEnd type="none" w="med" len="med"/>
+                      <a:tailEnd type="none" w="med" len="med"/>
+                    </a:lnT>
+                    <a:lnB w="12700" cap="flat" cmpd="sng" algn="ctr">
+                      <a:solidFill>
+                        <a:schemeClr val="tx1"/>
+                      </a:solidFill>
+                      <a:prstDash val="solid"/>
+                      <a:round/>
+                      <a:headEnd type="none" w="med" len="med"/>
+                      <a:tailEnd type="none" w="med" len="med"/>
+                    </a:lnB>
+                    <a:solidFill>
+                      <a:schemeClr val="tx2">
+                        <a:lumMod val="40000"/>
+                        <a:lumOff val="60000"/>
+                      </a:schemeClr>
+                    </a:solidFill>
+                  </a:tcPr>
+                </a:tc>
+              </a:tr>
+            </a:tbl>
+          </a:graphicData>
+        </a:graphic>
+      </p:graphicFrame>
+      <p:sp>
+        <p:nvSpPr>
+          <p:cNvPr id="7" name="TextBox 6"/>
+          <p:cNvSpPr txBox="1"/>
+          <p:nvPr/>
+        </p:nvSpPr>
+        <p:spPr>
+          <a:xfrm>
+            <a:off x="381000" y="3676471"/>
+            <a:ext cx="8305800" cy="830997"/>
+          </a:xfrm>
+          <a:prstGeom prst="rect">
+            <a:avLst/>
+          </a:prstGeom>
+          <a:noFill/>
+        </p:spPr>
+        <p:txBody>
+          <a:bodyPr wrap="square" rtlCol="0">
+            <a:spAutoFit/>
+          </a:bodyPr>
+          <a:lstStyle/>
+          <a:p>
+            <a:r>
+              <a:rPr lang="en-US" sz="2400" b="1" i="1" dirty="0" smtClean="0"/>
+              <a:t>Met by only using materials found on the NASA approved list of low outgassing materials (http://outgassing.nasa.gov).</a:t>
+            </a:r>
+            <a:endParaRPr lang="en-US" sz="2400" b="1" i="1" dirty="0"/>
+          </a:p>
+        </p:txBody>
+      </p:sp>
+    </p:spTree>
+    <p:extLst>
+      <p:ext uri="{BB962C8B-B14F-4D97-AF65-F5344CB8AC3E}">
+        <p14:creationId xmlns:p14="http://schemas.microsoft.com/office/powerpoint/2010/main" val="3834814454"/>
+      </p:ext>
+    </p:extLst>
+  </p:cSld>
+  <p:clrMapOvr>
+    <a:masterClrMapping/>
+  </p:clrMapOvr>
+</p:sld>
+</file>
+
+<file path=ppt/slides/slide4.xml><?xml version="1.0" encoding="utf-8"?>
+<p:sld xmlns:a="http://schemas.openxmlformats.org/drawingml/2006/main" xmlns:r="http://schemas.openxmlformats.org/officeDocument/2006/relationships" xmlns:p="http://schemas.openxmlformats.org/presentationml/2006/main">
+  <p:cSld>
+    <p:spTree>
+      <p:nvGrpSpPr>
+        <p:cNvPr id="1" name=""/>
+        <p:cNvGrpSpPr/>
+        <p:nvPr/>
+      </p:nvGrpSpPr>
+      <p:grpSpPr>
+        <a:xfrm>
+          <a:off x="0" y="0"/>
+          <a:ext cx="0" cy="0"/>
+          <a:chOff x="0" y="0"/>
+          <a:chExt cx="0" cy="0"/>
+        </a:xfrm>
+      </p:grpSpPr>
+      <p:sp>
+        <p:nvSpPr>
+          <p:cNvPr id="5" name="Title 1"/>
+          <p:cNvSpPr>
+            <a:spLocks noGrp="1"/>
+          </p:cNvSpPr>
+          <p:nvPr>
+            <p:ph type="title"/>
+          </p:nvPr>
+        </p:nvSpPr>
+        <p:spPr>
+          <a:xfrm>
+            <a:off x="457200" y="274638"/>
+            <a:ext cx="8229600" cy="1143000"/>
+          </a:xfrm>
+        </p:spPr>
+        <p:txBody>
+          <a:bodyPr>
+            <a:normAutofit/>
+          </a:bodyPr>
+          <a:lstStyle/>
+          <a:p>
+            <a:r>
+              <a:rPr lang="en-US" i="1" dirty="0" smtClean="0"/>
+              <a:t>RCL.PL.STR4</a:t>
+            </a:r>
+            <a:endParaRPr lang="en-US" i="1" dirty="0"/>
+          </a:p>
+        </p:txBody>
+      </p:sp>
+      <p:graphicFrame>
+        <p:nvGraphicFramePr>
+          <p:cNvPr id="6" name="Content Placeholder 3"/>
+          <p:cNvGraphicFramePr>
+            <a:graphicFrameLocks noGrp="1"/>
+          </p:cNvGraphicFramePr>
+          <p:nvPr>
+            <p:ph idx="1"/>
+            <p:extLst>
+              <p:ext uri="{D42A27DB-BD31-4B8C-83A1-F6EECF244321}">
+                <p14:modId xmlns:p14="http://schemas.microsoft.com/office/powerpoint/2010/main" val="3435413979"/>
+              </p:ext>
+            </p:extLst>
+          </p:nvPr>
+        </p:nvGraphicFramePr>
+        <p:xfrm>
+          <a:off x="457200" y="1371600"/>
+          <a:ext cx="8229600" cy="1656080"/>
+        </p:xfrm>
+        <a:graphic>
+          <a:graphicData uri="http://schemas.openxmlformats.org/drawingml/2006/table">
+            <a:tbl>
+              <a:tblPr firstRow="1" bandRow="1">
+                <a:tableStyleId>{5C22544A-7EE6-4342-B048-85BDC9FD1C3A}</a:tableStyleId>
+              </a:tblPr>
+              <a:tblGrid>
+                <a:gridCol w="3200400"/>
+                <a:gridCol w="5029200"/>
+              </a:tblGrid>
+              <a:tr h="370840">
+                <a:tc>
+                  <a:txBody>
+                    <a:bodyPr/>
+                    <a:lstStyle/>
+                    <a:p>
+                      <a:r>
+                        <a:rPr lang="en-US" b="0" dirty="0" smtClean="0">
+                          <a:solidFill>
+                            <a:schemeClr val="bg1"/>
+                          </a:solidFill>
+                        </a:rPr>
+                        <a:t> RVM Requirement Number</a:t>
+                      </a:r>
+                      <a:endParaRPr lang="en-US" b="0" dirty="0">
+                        <a:solidFill>
+                          <a:schemeClr val="bg1"/>
+                        </a:solidFill>
+                      </a:endParaRPr>
+                    </a:p>
+                  </a:txBody>
+                  <a:tcPr anchor="ctr">
+                    <a:lnL w="12700" cap="flat" cmpd="sng" algn="ctr">
+                      <a:solidFill>
+                        <a:schemeClr val="tx1"/>
+                      </a:solidFill>
+                      <a:prstDash val="solid"/>
+                      <a:round/>
+                      <a:headEnd type="none" w="med" len="med"/>
+                      <a:tailEnd type="none" w="med" len="med"/>
+                    </a:lnL>
+                    <a:lnR w="12700" cap="flat" cmpd="sng" algn="ctr">
+                      <a:solidFill>
+                        <a:schemeClr val="tx1"/>
+                      </a:solidFill>
+                      <a:prstDash val="solid"/>
+                      <a:round/>
+                      <a:headEnd type="none" w="med" len="med"/>
+                      <a:tailEnd type="none" w="med" len="med"/>
+                    </a:lnR>
+                    <a:lnT w="12700" cap="flat" cmpd="sng" algn="ctr">
+                      <a:solidFill>
+                        <a:schemeClr val="tx1"/>
+                      </a:solidFill>
+                      <a:prstDash val="solid"/>
+                      <a:round/>
+                      <a:headEnd type="none" w="med" len="med"/>
+                      <a:tailEnd type="none" w="med" len="med"/>
+                    </a:lnT>
+                    <a:lnB w="12700" cap="flat" cmpd="sng" algn="ctr">
+                      <a:solidFill>
+                        <a:schemeClr val="tx1"/>
+                      </a:solidFill>
+                      <a:prstDash val="solid"/>
+                      <a:round/>
+                      <a:headEnd type="none" w="med" len="med"/>
+                      <a:tailEnd type="none" w="med" len="med"/>
+                    </a:lnB>
+                    <a:solidFill>
+                      <a:schemeClr val="tx2">
+                        <a:lumMod val="75000"/>
+                      </a:schemeClr>
+                    </a:solidFill>
+                  </a:tcPr>
+                </a:tc>
+                <a:tc>
+                  <a:txBody>
+                    <a:bodyPr/>
+                    <a:lstStyle/>
+                    <a:p>
+                      <a:r>
+                        <a:rPr lang="en-US" b="1" dirty="0" smtClean="0">
+                          <a:solidFill>
+                            <a:schemeClr val="tx1"/>
+                          </a:solidFill>
+                        </a:rPr>
+                        <a:t>STR4</a:t>
+                      </a:r>
+                    </a:p>
+                  </a:txBody>
+                  <a:tcPr>
+                    <a:lnL w="12700" cap="flat" cmpd="sng" algn="ctr">
+                      <a:solidFill>
+                        <a:schemeClr val="tx1"/>
+                      </a:solidFill>
+                      <a:prstDash val="solid"/>
+                      <a:round/>
+                      <a:headEnd type="none" w="med" len="med"/>
+                      <a:tailEnd type="none" w="med" len="med"/>
+                    </a:lnL>
+                    <a:lnR w="12700" cap="flat" cmpd="sng" algn="ctr">
+                      <a:solidFill>
+                        <a:schemeClr val="tx1"/>
+                      </a:solidFill>
+                      <a:prstDash val="solid"/>
+                      <a:round/>
+                      <a:headEnd type="none" w="med" len="med"/>
+                      <a:tailEnd type="none" w="med" len="med"/>
+                    </a:lnR>
+                    <a:lnT w="12700" cap="flat" cmpd="sng" algn="ctr">
+                      <a:solidFill>
+                        <a:schemeClr val="tx1"/>
+                      </a:solidFill>
+                      <a:prstDash val="solid"/>
+                      <a:round/>
+                      <a:headEnd type="none" w="med" len="med"/>
+                      <a:tailEnd type="none" w="med" len="med"/>
+                    </a:lnT>
+                    <a:lnB w="12700" cap="flat" cmpd="sng" algn="ctr">
+                      <a:solidFill>
+                        <a:schemeClr val="tx1"/>
+                      </a:solidFill>
+                      <a:prstDash val="solid"/>
+                      <a:round/>
+                      <a:headEnd type="none" w="med" len="med"/>
+                      <a:tailEnd type="none" w="med" len="med"/>
+                    </a:lnB>
+                    <a:solidFill>
+                      <a:schemeClr val="tx2">
+                        <a:lumMod val="40000"/>
+                        <a:lumOff val="60000"/>
+                      </a:schemeClr>
+                    </a:solidFill>
+                  </a:tcPr>
+                </a:tc>
+              </a:tr>
+              <a:tr h="370840">
+                <a:tc>
+                  <a:txBody>
+                    <a:bodyPr/>
+                    <a:lstStyle/>
+                    <a:p>
+                      <a:r>
+                        <a:rPr lang="en-US" b="0" dirty="0" smtClean="0">
+                          <a:solidFill>
+                            <a:schemeClr val="bg1"/>
+                          </a:solidFill>
+                        </a:rPr>
+                        <a:t>RVM </a:t>
+                      </a:r>
+                      <a:r>
+                        <a:rPr lang="en-US" b="0" baseline="0" dirty="0" smtClean="0">
+                          <a:solidFill>
+                            <a:schemeClr val="bg1"/>
+                          </a:solidFill>
+                        </a:rPr>
+                        <a:t>Requirement Wording</a:t>
+                      </a:r>
+                      <a:endParaRPr lang="en-US" b="0" dirty="0">
+                        <a:solidFill>
+                          <a:schemeClr val="bg1"/>
+                        </a:solidFill>
+                      </a:endParaRPr>
+                    </a:p>
+                  </a:txBody>
+                  <a:tcPr anchor="ctr">
+                    <a:lnL w="12700" cap="flat" cmpd="sng" algn="ctr">
+                      <a:solidFill>
+                        <a:schemeClr val="tx1"/>
+                      </a:solidFill>
+                      <a:prstDash val="solid"/>
+                      <a:round/>
+                      <a:headEnd type="none" w="med" len="med"/>
+                      <a:tailEnd type="none" w="med" len="med"/>
+                    </a:lnL>
+                    <a:lnR w="12700" cap="flat" cmpd="sng" algn="ctr">
+                      <a:solidFill>
+                        <a:schemeClr val="tx1"/>
+                      </a:solidFill>
+                      <a:prstDash val="solid"/>
+                      <a:round/>
+                      <a:headEnd type="none" w="med" len="med"/>
+                      <a:tailEnd type="none" w="med" len="med"/>
+                    </a:lnR>
+                    <a:lnT w="12700" cap="flat" cmpd="sng" algn="ctr">
+                      <a:solidFill>
+                        <a:schemeClr val="tx1"/>
+                      </a:solidFill>
+                      <a:prstDash val="solid"/>
+                      <a:round/>
+                      <a:headEnd type="none" w="med" len="med"/>
+                      <a:tailEnd type="none" w="med" len="med"/>
+                    </a:lnT>
+                    <a:lnB w="12700" cap="flat" cmpd="sng" algn="ctr">
+                      <a:solidFill>
+                        <a:schemeClr val="tx1"/>
+                      </a:solidFill>
+                      <a:prstDash val="solid"/>
+                      <a:round/>
+                      <a:headEnd type="none" w="med" len="med"/>
+                      <a:tailEnd type="none" w="med" len="med"/>
+                    </a:lnB>
+                    <a:solidFill>
+                      <a:schemeClr val="tx2">
+                        <a:lumMod val="75000"/>
+                      </a:schemeClr>
+                    </a:solidFill>
+                  </a:tcPr>
+                </a:tc>
+                <a:tc>
+                  <a:txBody>
+                    <a:bodyPr/>
+                    <a:lstStyle/>
+                    <a:p>
+                      <a:r>
+                        <a:rPr lang="en-US" b="1" dirty="0" smtClean="0">
+                          <a:solidFill>
+                            <a:schemeClr val="tx1"/>
+                          </a:solidFill>
+                        </a:rPr>
+                        <a:t>All materials used in the</a:t>
+                      </a:r>
+                      <a:r>
+                        <a:rPr lang="en-US" b="1" baseline="0" dirty="0" smtClean="0">
+                          <a:solidFill>
+                            <a:schemeClr val="tx1"/>
+                          </a:solidFill>
+                        </a:rPr>
+                        <a:t> CubeSat shall have a Collected Volatile Condensable Material of less than 0.1 %</a:t>
+                      </a:r>
+                      <a:endParaRPr lang="en-US" b="1" dirty="0">
+                        <a:solidFill>
+                          <a:schemeClr val="tx1"/>
+                        </a:solidFill>
+                      </a:endParaRPr>
+                    </a:p>
+                  </a:txBody>
+                  <a:tcPr>
+                    <a:lnL w="12700" cap="flat" cmpd="sng" algn="ctr">
+                      <a:solidFill>
+                        <a:schemeClr val="tx1"/>
+                      </a:solidFill>
+                      <a:prstDash val="solid"/>
+                      <a:round/>
+                      <a:headEnd type="none" w="med" len="med"/>
+                      <a:tailEnd type="none" w="med" len="med"/>
+                    </a:lnL>
+                    <a:lnR w="12700" cap="flat" cmpd="sng" algn="ctr">
+                      <a:solidFill>
+                        <a:schemeClr val="tx1"/>
+                      </a:solidFill>
+                      <a:prstDash val="solid"/>
+                      <a:round/>
+                      <a:headEnd type="none" w="med" len="med"/>
+                      <a:tailEnd type="none" w="med" len="med"/>
+                    </a:lnR>
+                    <a:lnT w="12700" cap="flat" cmpd="sng" algn="ctr">
+                      <a:solidFill>
+                        <a:schemeClr val="tx1"/>
+                      </a:solidFill>
+                      <a:prstDash val="solid"/>
+                      <a:round/>
+                      <a:headEnd type="none" w="med" len="med"/>
+                      <a:tailEnd type="none" w="med" len="med"/>
+                    </a:lnT>
+                    <a:lnB w="12700" cap="flat" cmpd="sng" algn="ctr">
+                      <a:solidFill>
+                        <a:schemeClr val="tx1"/>
+                      </a:solidFill>
+                      <a:prstDash val="solid"/>
+                      <a:round/>
+                      <a:headEnd type="none" w="med" len="med"/>
+                      <a:tailEnd type="none" w="med" len="med"/>
+                    </a:lnB>
+                    <a:solidFill>
+                      <a:schemeClr val="tx2">
+                        <a:lumMod val="40000"/>
+                        <a:lumOff val="60000"/>
+                      </a:schemeClr>
+                    </a:solidFill>
+                  </a:tcPr>
+                </a:tc>
+              </a:tr>
+              <a:tr h="370840">
+                <a:tc>
+                  <a:txBody>
+                    <a:bodyPr/>
+                    <a:lstStyle/>
+                    <a:p>
+                      <a:r>
+                        <a:rPr lang="en-US" b="0" dirty="0" smtClean="0">
+                          <a:solidFill>
+                            <a:schemeClr val="bg1"/>
+                          </a:solidFill>
+                        </a:rPr>
+                        <a:t>Validation Method</a:t>
+                      </a:r>
+                      <a:endParaRPr lang="en-US" b="0" dirty="0">
+                        <a:solidFill>
+                          <a:schemeClr val="bg1"/>
+                        </a:solidFill>
+                      </a:endParaRPr>
+                    </a:p>
+                  </a:txBody>
+                  <a:tcPr anchor="ctr">
+                    <a:lnL w="12700" cap="flat" cmpd="sng" algn="ctr">
+                      <a:solidFill>
+                        <a:schemeClr val="tx1"/>
+                      </a:solidFill>
+                      <a:prstDash val="solid"/>
+                      <a:round/>
+                      <a:headEnd type="none" w="med" len="med"/>
+                      <a:tailEnd type="none" w="med" len="med"/>
+                    </a:lnL>
+                    <a:lnR w="12700" cap="flat" cmpd="sng" algn="ctr">
+                      <a:solidFill>
+                        <a:schemeClr val="tx1"/>
+                      </a:solidFill>
+                      <a:prstDash val="solid"/>
+                      <a:round/>
+                      <a:headEnd type="none" w="med" len="med"/>
+                      <a:tailEnd type="none" w="med" len="med"/>
+                    </a:lnR>
+                    <a:lnT w="12700" cap="flat" cmpd="sng" algn="ctr">
+                      <a:solidFill>
+                        <a:schemeClr val="tx1"/>
+                      </a:solidFill>
+                      <a:prstDash val="solid"/>
+                      <a:round/>
+                      <a:headEnd type="none" w="med" len="med"/>
+                      <a:tailEnd type="none" w="med" len="med"/>
+                    </a:lnT>
+                    <a:lnB w="12700" cap="flat" cmpd="sng" algn="ctr">
+                      <a:solidFill>
+                        <a:schemeClr val="tx1"/>
+                      </a:solidFill>
+                      <a:prstDash val="solid"/>
+                      <a:round/>
+                      <a:headEnd type="none" w="med" len="med"/>
+                      <a:tailEnd type="none" w="med" len="med"/>
+                    </a:lnB>
+                    <a:solidFill>
+                      <a:schemeClr val="tx2">
+                        <a:lumMod val="75000"/>
+                      </a:schemeClr>
+                    </a:solidFill>
+                  </a:tcPr>
+                </a:tc>
+                <a:tc>
+                  <a:txBody>
+                    <a:bodyPr/>
+                    <a:lstStyle/>
+                    <a:p>
+                      <a:r>
+                        <a:rPr lang="en-US" b="1" i="1" dirty="0" smtClean="0">
+                          <a:solidFill>
+                            <a:schemeClr val="tx1"/>
+                          </a:solidFill>
+                        </a:rPr>
+                        <a:t>Analysis</a:t>
+                      </a:r>
+                      <a:endParaRPr lang="en-US" b="1" i="1" dirty="0">
+                        <a:solidFill>
+                          <a:schemeClr val="tx1"/>
+                        </a:solidFill>
+                      </a:endParaRPr>
+                    </a:p>
+                  </a:txBody>
+                  <a:tcPr>
+                    <a:lnL w="12700" cap="flat" cmpd="sng" algn="ctr">
+                      <a:solidFill>
+                        <a:schemeClr val="tx1"/>
+                      </a:solidFill>
+                      <a:prstDash val="solid"/>
+                      <a:round/>
+                      <a:headEnd type="none" w="med" len="med"/>
+                      <a:tailEnd type="none" w="med" len="med"/>
+                    </a:lnL>
+                    <a:lnR w="12700" cap="flat" cmpd="sng" algn="ctr">
+                      <a:solidFill>
+                        <a:schemeClr val="tx1"/>
+                      </a:solidFill>
+                      <a:prstDash val="solid"/>
+                      <a:round/>
+                      <a:headEnd type="none" w="med" len="med"/>
+                      <a:tailEnd type="none" w="med" len="med"/>
+                    </a:lnR>
+                    <a:lnT w="12700" cap="flat" cmpd="sng" algn="ctr">
+                      <a:solidFill>
+                        <a:schemeClr val="tx1"/>
+                      </a:solidFill>
+                      <a:prstDash val="solid"/>
+                      <a:round/>
+                      <a:headEnd type="none" w="med" len="med"/>
+                      <a:tailEnd type="none" w="med" len="med"/>
+                    </a:lnT>
+                    <a:lnB w="12700" cap="flat" cmpd="sng" algn="ctr">
+                      <a:solidFill>
+                        <a:schemeClr val="tx1"/>
+                      </a:solidFill>
+                      <a:prstDash val="solid"/>
+                      <a:round/>
+                      <a:headEnd type="none" w="med" len="med"/>
+                      <a:tailEnd type="none" w="med" len="med"/>
+                    </a:lnB>
+                    <a:solidFill>
+                      <a:schemeClr val="tx2">
+                        <a:lumMod val="40000"/>
+                        <a:lumOff val="60000"/>
+                      </a:schemeClr>
+                    </a:solidFill>
+                  </a:tcPr>
+                </a:tc>
+              </a:tr>
+            </a:tbl>
+          </a:graphicData>
+        </a:graphic>
+      </p:graphicFrame>
+      <p:sp>
+        <p:nvSpPr>
+          <p:cNvPr id="7" name="TextBox 6"/>
+          <p:cNvSpPr txBox="1"/>
+          <p:nvPr/>
+        </p:nvSpPr>
+        <p:spPr>
+          <a:xfrm>
+            <a:off x="381000" y="3676471"/>
+            <a:ext cx="8305800" cy="830997"/>
+          </a:xfrm>
+          <a:prstGeom prst="rect">
+            <a:avLst/>
+          </a:prstGeom>
+          <a:noFill/>
+        </p:spPr>
+        <p:txBody>
+          <a:bodyPr wrap="square" rtlCol="0">
+            <a:spAutoFit/>
+          </a:bodyPr>
+          <a:lstStyle/>
+          <a:p>
+            <a:r>
+              <a:rPr lang="en-US" sz="2400" b="1" i="1" dirty="0"/>
+              <a:t>Met by only using materials found on the NASA approved list of low outgassing materials (http://outgassing.nasa.gov</a:t>
+            </a:r>
+            <a:r>
+              <a:rPr lang="en-US" sz="2400" b="1" i="1" dirty="0" smtClean="0"/>
+              <a:t>).</a:t>
+            </a:r>
+            <a:endParaRPr lang="en-US" sz="2400" b="1" i="1" dirty="0"/>
+          </a:p>
+        </p:txBody>
+      </p:sp>
+    </p:spTree>
+    <p:extLst>
+      <p:ext uri="{BB962C8B-B14F-4D97-AF65-F5344CB8AC3E}">
+        <p14:creationId xmlns:p14="http://schemas.microsoft.com/office/powerpoint/2010/main" val="1268200640"/>
+      </p:ext>
+    </p:extLst>
+  </p:cSld>
+  <p:clrMapOvr>
+    <a:masterClrMapping/>
+  </p:clrMapOvr>
+</p:sld>
+</file>
+
+<file path=ppt/slides/slide5.xml><?xml version="1.0" encoding="utf-8"?>
+<p:sld xmlns:a="http://schemas.openxmlformats.org/drawingml/2006/main" xmlns:r="http://schemas.openxmlformats.org/officeDocument/2006/relationships" xmlns:p="http://schemas.openxmlformats.org/presentationml/2006/main">
+  <p:cSld>
+    <p:spTree>
+      <p:nvGrpSpPr>
+        <p:cNvPr id="1" name=""/>
+        <p:cNvGrpSpPr/>
+        <p:nvPr/>
+      </p:nvGrpSpPr>
+      <p:grpSpPr>
+        <a:xfrm>
+          <a:off x="0" y="0"/>
+          <a:ext cx="0" cy="0"/>
+          <a:chOff x="0" y="0"/>
+          <a:chExt cx="0" cy="0"/>
+        </a:xfrm>
+      </p:grpSpPr>
+      <p:sp>
+        <p:nvSpPr>
+          <p:cNvPr id="5" name="Title 1"/>
+          <p:cNvSpPr>
+            <a:spLocks noGrp="1"/>
+          </p:cNvSpPr>
+          <p:nvPr>
+            <p:ph type="title"/>
+          </p:nvPr>
+        </p:nvSpPr>
+        <p:spPr>
+          <a:xfrm>
+            <a:off x="457200" y="274638"/>
+            <a:ext cx="8229600" cy="1143000"/>
+          </a:xfrm>
+        </p:spPr>
+        <p:txBody>
+          <a:bodyPr>
+            <a:normAutofit/>
+          </a:bodyPr>
+          <a:lstStyle/>
+          <a:p>
+            <a:r>
+              <a:rPr lang="en-US" i="1" dirty="0" smtClean="0"/>
+              <a:t>RCL.PL.MOP1</a:t>
+            </a:r>
+            <a:endParaRPr lang="en-US" i="1" dirty="0"/>
+          </a:p>
+        </p:txBody>
+      </p:sp>
+      <p:graphicFrame>
+        <p:nvGraphicFramePr>
+          <p:cNvPr id="6" name="Content Placeholder 3"/>
+          <p:cNvGraphicFramePr>
+            <a:graphicFrameLocks noGrp="1"/>
+          </p:cNvGraphicFramePr>
+          <p:nvPr>
+            <p:ph idx="1"/>
+            <p:extLst>
+              <p:ext uri="{D42A27DB-BD31-4B8C-83A1-F6EECF244321}">
+                <p14:modId xmlns:p14="http://schemas.microsoft.com/office/powerpoint/2010/main" val="2692413085"/>
+              </p:ext>
+            </p:extLst>
+          </p:nvPr>
+        </p:nvGraphicFramePr>
+        <p:xfrm>
+          <a:off x="457200" y="1371600"/>
+          <a:ext cx="8229600" cy="1112520"/>
+        </p:xfrm>
+        <a:graphic>
+          <a:graphicData uri="http://schemas.openxmlformats.org/drawingml/2006/table">
+            <a:tbl>
+              <a:tblPr firstRow="1" bandRow="1">
+                <a:tableStyleId>{5C22544A-7EE6-4342-B048-85BDC9FD1C3A}</a:tableStyleId>
+              </a:tblPr>
+              <a:tblGrid>
+                <a:gridCol w="3200400"/>
+                <a:gridCol w="5029200"/>
+              </a:tblGrid>
+              <a:tr h="370840">
+                <a:tc>
+                  <a:txBody>
+                    <a:bodyPr/>
+                    <a:lstStyle/>
+                    <a:p>
+                      <a:r>
+                        <a:rPr lang="en-US" b="0" dirty="0" smtClean="0">
+                          <a:solidFill>
+                            <a:schemeClr val="bg1"/>
+                          </a:solidFill>
+                        </a:rPr>
+                        <a:t> RVM Requirement Number</a:t>
+                      </a:r>
+                      <a:endParaRPr lang="en-US" b="0" dirty="0">
+                        <a:solidFill>
+                          <a:schemeClr val="bg1"/>
+                        </a:solidFill>
+                      </a:endParaRPr>
+                    </a:p>
+                  </a:txBody>
+                  <a:tcPr anchor="ctr">
+                    <a:lnL w="12700" cap="flat" cmpd="sng" algn="ctr">
+                      <a:solidFill>
+                        <a:schemeClr val="tx1"/>
+                      </a:solidFill>
+                      <a:prstDash val="solid"/>
+                      <a:round/>
+                      <a:headEnd type="none" w="med" len="med"/>
+                      <a:tailEnd type="none" w="med" len="med"/>
+                    </a:lnL>
+                    <a:lnR w="12700" cap="flat" cmpd="sng" algn="ctr">
+                      <a:solidFill>
+                        <a:schemeClr val="tx1"/>
+                      </a:solidFill>
+                      <a:prstDash val="solid"/>
+                      <a:round/>
+                      <a:headEnd type="none" w="med" len="med"/>
+                      <a:tailEnd type="none" w="med" len="med"/>
+                    </a:lnR>
+                    <a:lnT w="12700" cap="flat" cmpd="sng" algn="ctr">
+                      <a:solidFill>
+                        <a:schemeClr val="tx1"/>
+                      </a:solidFill>
+                      <a:prstDash val="solid"/>
+                      <a:round/>
+                      <a:headEnd type="none" w="med" len="med"/>
+                      <a:tailEnd type="none" w="med" len="med"/>
+                    </a:lnT>
+                    <a:lnB w="12700" cap="flat" cmpd="sng" algn="ctr">
+                      <a:solidFill>
+                        <a:schemeClr val="tx1"/>
+                      </a:solidFill>
+                      <a:prstDash val="solid"/>
+                      <a:round/>
+                      <a:headEnd type="none" w="med" len="med"/>
+                      <a:tailEnd type="none" w="med" len="med"/>
+                    </a:lnB>
+                    <a:solidFill>
+                      <a:schemeClr val="tx2">
+                        <a:lumMod val="75000"/>
+                      </a:schemeClr>
+                    </a:solidFill>
+                  </a:tcPr>
+                </a:tc>
+                <a:tc>
+                  <a:txBody>
+                    <a:bodyPr/>
+                    <a:lstStyle/>
+                    <a:p>
+                      <a:r>
+                        <a:rPr lang="en-US" b="1" dirty="0" smtClean="0">
+                          <a:solidFill>
+                            <a:schemeClr val="tx1"/>
+                          </a:solidFill>
+                        </a:rPr>
+                        <a:t>MOP1</a:t>
+                      </a:r>
+                      <a:endParaRPr lang="en-US" b="1" dirty="0">
+                        <a:solidFill>
+                          <a:schemeClr val="tx1"/>
+                        </a:solidFill>
+                      </a:endParaRPr>
+                    </a:p>
+                  </a:txBody>
+                  <a:tcPr>
+                    <a:lnL w="12700" cap="flat" cmpd="sng" algn="ctr">
+                      <a:solidFill>
+                        <a:schemeClr val="tx1"/>
+                      </a:solidFill>
+                      <a:prstDash val="solid"/>
+                      <a:round/>
+                      <a:headEnd type="none" w="med" len="med"/>
+                      <a:tailEnd type="none" w="med" len="med"/>
+                    </a:lnL>
+                    <a:lnR w="12700" cap="flat" cmpd="sng" algn="ctr">
+                      <a:solidFill>
+                        <a:schemeClr val="tx1"/>
+                      </a:solidFill>
+                      <a:prstDash val="solid"/>
+                      <a:round/>
+                      <a:headEnd type="none" w="med" len="med"/>
+                      <a:tailEnd type="none" w="med" len="med"/>
+                    </a:lnR>
+                    <a:lnT w="12700" cap="flat" cmpd="sng" algn="ctr">
+                      <a:solidFill>
+                        <a:schemeClr val="tx1"/>
+                      </a:solidFill>
+                      <a:prstDash val="solid"/>
+                      <a:round/>
+                      <a:headEnd type="none" w="med" len="med"/>
+                      <a:tailEnd type="none" w="med" len="med"/>
+                    </a:lnT>
+                    <a:lnB w="12700" cap="flat" cmpd="sng" algn="ctr">
+                      <a:solidFill>
+                        <a:schemeClr val="tx1"/>
+                      </a:solidFill>
+                      <a:prstDash val="solid"/>
+                      <a:round/>
+                      <a:headEnd type="none" w="med" len="med"/>
+                      <a:tailEnd type="none" w="med" len="med"/>
+                    </a:lnB>
+                    <a:solidFill>
+                      <a:schemeClr val="tx2">
+                        <a:lumMod val="40000"/>
+                        <a:lumOff val="60000"/>
+                      </a:schemeClr>
+                    </a:solidFill>
+                  </a:tcPr>
+                </a:tc>
+              </a:tr>
+              <a:tr h="370840">
+                <a:tc>
+                  <a:txBody>
+                    <a:bodyPr/>
+                    <a:lstStyle/>
+                    <a:p>
+                      <a:r>
+                        <a:rPr lang="en-US" b="0" dirty="0" smtClean="0">
+                          <a:solidFill>
+                            <a:schemeClr val="bg1"/>
+                          </a:solidFill>
+                        </a:rPr>
+                        <a:t>RVM </a:t>
+                      </a:r>
+                      <a:r>
+                        <a:rPr lang="en-US" b="0" baseline="0" dirty="0" smtClean="0">
+                          <a:solidFill>
+                            <a:schemeClr val="bg1"/>
+                          </a:solidFill>
+                        </a:rPr>
+                        <a:t>Requirement Wording</a:t>
+                      </a:r>
+                      <a:endParaRPr lang="en-US" b="0" dirty="0">
+                        <a:solidFill>
+                          <a:schemeClr val="bg1"/>
+                        </a:solidFill>
+                      </a:endParaRPr>
+                    </a:p>
+                  </a:txBody>
+                  <a:tcPr anchor="ctr">
+                    <a:lnL w="12700" cap="flat" cmpd="sng" algn="ctr">
+                      <a:solidFill>
+                        <a:schemeClr val="tx1"/>
+                      </a:solidFill>
+                      <a:prstDash val="solid"/>
+                      <a:round/>
+                      <a:headEnd type="none" w="med" len="med"/>
+                      <a:tailEnd type="none" w="med" len="med"/>
+                    </a:lnL>
+                    <a:lnR w="12700" cap="flat" cmpd="sng" algn="ctr">
+                      <a:solidFill>
+                        <a:schemeClr val="tx1"/>
+                      </a:solidFill>
+                      <a:prstDash val="solid"/>
+                      <a:round/>
+                      <a:headEnd type="none" w="med" len="med"/>
+                      <a:tailEnd type="none" w="med" len="med"/>
+                    </a:lnR>
+                    <a:lnT w="12700" cap="flat" cmpd="sng" algn="ctr">
+                      <a:solidFill>
+                        <a:schemeClr val="tx1"/>
+                      </a:solidFill>
+                      <a:prstDash val="solid"/>
+                      <a:round/>
+                      <a:headEnd type="none" w="med" len="med"/>
+                      <a:tailEnd type="none" w="med" len="med"/>
+                    </a:lnT>
+                    <a:lnB w="12700" cap="flat" cmpd="sng" algn="ctr">
+                      <a:solidFill>
+                        <a:schemeClr val="tx1"/>
+                      </a:solidFill>
+                      <a:prstDash val="solid"/>
+                      <a:round/>
+                      <a:headEnd type="none" w="med" len="med"/>
+                      <a:tailEnd type="none" w="med" len="med"/>
+                    </a:lnB>
+                    <a:solidFill>
+                      <a:schemeClr val="tx2">
+                        <a:lumMod val="75000"/>
+                      </a:schemeClr>
+                    </a:solidFill>
+                  </a:tcPr>
+                </a:tc>
+                <a:tc>
+                  <a:txBody>
+                    <a:bodyPr/>
+                    <a:lstStyle/>
+                    <a:p>
+                      <a:r>
+                        <a:rPr lang="en-US" b="1" dirty="0" smtClean="0">
+                          <a:solidFill>
+                            <a:schemeClr val="tx1"/>
+                          </a:solidFill>
+                        </a:rPr>
+                        <a:t>The CubeSat must be</a:t>
+                      </a:r>
+                      <a:r>
+                        <a:rPr lang="en-US" b="1" baseline="0" dirty="0" smtClean="0">
+                          <a:solidFill>
+                            <a:schemeClr val="tx1"/>
+                          </a:solidFill>
+                        </a:rPr>
+                        <a:t> in orbit for at least 6 months</a:t>
+                      </a:r>
+                      <a:endParaRPr lang="en-US" b="1" dirty="0">
+                        <a:solidFill>
+                          <a:schemeClr val="tx1"/>
+                        </a:solidFill>
+                      </a:endParaRPr>
+                    </a:p>
+                  </a:txBody>
+                  <a:tcPr>
+                    <a:lnL w="12700" cap="flat" cmpd="sng" algn="ctr">
+                      <a:solidFill>
+                        <a:schemeClr val="tx1"/>
+                      </a:solidFill>
+                      <a:prstDash val="solid"/>
+                      <a:round/>
+                      <a:headEnd type="none" w="med" len="med"/>
+                      <a:tailEnd type="none" w="med" len="med"/>
+                    </a:lnL>
+                    <a:lnR w="12700" cap="flat" cmpd="sng" algn="ctr">
+                      <a:solidFill>
+                        <a:schemeClr val="tx1"/>
+                      </a:solidFill>
+                      <a:prstDash val="solid"/>
+                      <a:round/>
+                      <a:headEnd type="none" w="med" len="med"/>
+                      <a:tailEnd type="none" w="med" len="med"/>
+                    </a:lnR>
+                    <a:lnT w="12700" cap="flat" cmpd="sng" algn="ctr">
+                      <a:solidFill>
+                        <a:schemeClr val="tx1"/>
+                      </a:solidFill>
+                      <a:prstDash val="solid"/>
+                      <a:round/>
+                      <a:headEnd type="none" w="med" len="med"/>
+                      <a:tailEnd type="none" w="med" len="med"/>
+                    </a:lnT>
+                    <a:lnB w="12700" cap="flat" cmpd="sng" algn="ctr">
+                      <a:solidFill>
+                        <a:schemeClr val="tx1"/>
+                      </a:solidFill>
+                      <a:prstDash val="solid"/>
+                      <a:round/>
+                      <a:headEnd type="none" w="med" len="med"/>
+                      <a:tailEnd type="none" w="med" len="med"/>
+                    </a:lnB>
+                    <a:solidFill>
+                      <a:schemeClr val="tx2">
+                        <a:lumMod val="40000"/>
+                        <a:lumOff val="60000"/>
+                      </a:schemeClr>
+                    </a:solidFill>
+                  </a:tcPr>
+                </a:tc>
+              </a:tr>
+              <a:tr h="370840">
+                <a:tc>
+                  <a:txBody>
+                    <a:bodyPr/>
+                    <a:lstStyle/>
+                    <a:p>
+                      <a:r>
+                        <a:rPr lang="en-US" b="0" dirty="0" smtClean="0">
+                          <a:solidFill>
+                            <a:schemeClr val="bg1"/>
+                          </a:solidFill>
+                        </a:rPr>
+                        <a:t>Validation Method</a:t>
+                      </a:r>
+                      <a:endParaRPr lang="en-US" b="0" dirty="0">
+                        <a:solidFill>
+                          <a:schemeClr val="bg1"/>
+                        </a:solidFill>
+                      </a:endParaRPr>
+                    </a:p>
+                  </a:txBody>
+                  <a:tcPr anchor="ctr">
+                    <a:lnL w="12700" cap="flat" cmpd="sng" algn="ctr">
+                      <a:solidFill>
+                        <a:schemeClr val="tx1"/>
+                      </a:solidFill>
+                      <a:prstDash val="solid"/>
+                      <a:round/>
+                      <a:headEnd type="none" w="med" len="med"/>
+                      <a:tailEnd type="none" w="med" len="med"/>
+                    </a:lnL>
+                    <a:lnR w="12700" cap="flat" cmpd="sng" algn="ctr">
+                      <a:solidFill>
+                        <a:schemeClr val="tx1"/>
+                      </a:solidFill>
+                      <a:prstDash val="solid"/>
+                      <a:round/>
+                      <a:headEnd type="none" w="med" len="med"/>
+                      <a:tailEnd type="none" w="med" len="med"/>
+                    </a:lnR>
+                    <a:lnT w="12700" cap="flat" cmpd="sng" algn="ctr">
+                      <a:solidFill>
+                        <a:schemeClr val="tx1"/>
+                      </a:solidFill>
+                      <a:prstDash val="solid"/>
+                      <a:round/>
+                      <a:headEnd type="none" w="med" len="med"/>
+                      <a:tailEnd type="none" w="med" len="med"/>
+                    </a:lnT>
+                    <a:lnB w="12700" cap="flat" cmpd="sng" algn="ctr">
+                      <a:solidFill>
+                        <a:schemeClr val="tx1"/>
+                      </a:solidFill>
+                      <a:prstDash val="solid"/>
+                      <a:round/>
+                      <a:headEnd type="none" w="med" len="med"/>
+                      <a:tailEnd type="none" w="med" len="med"/>
+                    </a:lnB>
+                    <a:solidFill>
+                      <a:schemeClr val="tx2">
+                        <a:lumMod val="75000"/>
+                      </a:schemeClr>
+                    </a:solidFill>
+                  </a:tcPr>
+                </a:tc>
+                <a:tc>
+                  <a:txBody>
+                    <a:bodyPr/>
+                    <a:lstStyle/>
+                    <a:p>
+                      <a:r>
+                        <a:rPr lang="en-US" b="1" i="1" dirty="0" smtClean="0">
+                          <a:solidFill>
+                            <a:schemeClr val="tx1"/>
+                          </a:solidFill>
+                        </a:rPr>
+                        <a:t>Analysis</a:t>
+                      </a:r>
+                      <a:endParaRPr lang="en-US" b="1" i="1" dirty="0">
+                        <a:solidFill>
+                          <a:schemeClr val="tx1"/>
+                        </a:solidFill>
+                      </a:endParaRPr>
+                    </a:p>
+                  </a:txBody>
+                  <a:tcPr>
+                    <a:lnL w="12700" cap="flat" cmpd="sng" algn="ctr">
+                      <a:solidFill>
+                        <a:schemeClr val="tx1"/>
+                      </a:solidFill>
+                      <a:prstDash val="solid"/>
+                      <a:round/>
+                      <a:headEnd type="none" w="med" len="med"/>
+                      <a:tailEnd type="none" w="med" len="med"/>
+                    </a:lnL>
+                    <a:lnR w="12700" cap="flat" cmpd="sng" algn="ctr">
+                      <a:solidFill>
+                        <a:schemeClr val="tx1"/>
+                      </a:solidFill>
+                      <a:prstDash val="solid"/>
+                      <a:round/>
+                      <a:headEnd type="none" w="med" len="med"/>
+                      <a:tailEnd type="none" w="med" len="med"/>
+                    </a:lnR>
+                    <a:lnT w="12700" cap="flat" cmpd="sng" algn="ctr">
+                      <a:solidFill>
+                        <a:schemeClr val="tx1"/>
+                      </a:solidFill>
+                      <a:prstDash val="solid"/>
+                      <a:round/>
+                      <a:headEnd type="none" w="med" len="med"/>
+                      <a:tailEnd type="none" w="med" len="med"/>
+                    </a:lnT>
+                    <a:lnB w="12700" cap="flat" cmpd="sng" algn="ctr">
+                      <a:solidFill>
+                        <a:schemeClr val="tx1"/>
+                      </a:solidFill>
+                      <a:prstDash val="solid"/>
+                      <a:round/>
+                      <a:headEnd type="none" w="med" len="med"/>
+                      <a:tailEnd type="none" w="med" len="med"/>
+                    </a:lnB>
+                    <a:solidFill>
+                      <a:schemeClr val="tx2">
+                        <a:lumMod val="40000"/>
+                        <a:lumOff val="60000"/>
+                      </a:schemeClr>
+                    </a:solidFill>
+                  </a:tcPr>
+                </a:tc>
+              </a:tr>
+            </a:tbl>
+          </a:graphicData>
+        </a:graphic>
+      </p:graphicFrame>
+      <p:sp>
+        <p:nvSpPr>
+          <p:cNvPr id="7" name="TextBox 6"/>
+          <p:cNvSpPr txBox="1"/>
+          <p:nvPr/>
+        </p:nvSpPr>
+        <p:spPr>
+          <a:xfrm>
+            <a:off x="381000" y="3676471"/>
+            <a:ext cx="8305800" cy="1569660"/>
+          </a:xfrm>
+          <a:prstGeom prst="rect">
+            <a:avLst/>
+          </a:prstGeom>
+          <a:noFill/>
+        </p:spPr>
+        <p:txBody>
+          <a:bodyPr wrap="square" rtlCol="0">
+            <a:spAutoFit/>
+          </a:bodyPr>
+          <a:lstStyle/>
+          <a:p>
+            <a:r>
+              <a:rPr lang="en-US" sz="2400" b="1" i="1" dirty="0" smtClean="0"/>
+              <a:t>Met by constructing an accurate power budget, performing a battery charge / discharge test, performing a day-in-the-life test, performing a solar panel charge test, and performing a solar cell degradation analysis.</a:t>
+            </a:r>
+            <a:endParaRPr lang="en-US" sz="2400" b="1" i="1" dirty="0"/>
+          </a:p>
+        </p:txBody>
+      </p:sp>
+    </p:spTree>
+    <p:extLst>
+      <p:ext uri="{BB962C8B-B14F-4D97-AF65-F5344CB8AC3E}">
+        <p14:creationId xmlns:p14="http://schemas.microsoft.com/office/powerpoint/2010/main" val="813934142"/>
+      </p:ext>
+    </p:extLst>
+  </p:cSld>
+  <p:clrMapOvr>
+    <a:masterClrMapping/>
+  </p:clrMapOvr>
+</p:sld>
+</file>
+
+<file path=ppt/slides/slide6.xml><?xml version="1.0" encoding="utf-8"?>
+<p:sld xmlns:a="http://schemas.openxmlformats.org/drawingml/2006/main" xmlns:r="http://schemas.openxmlformats.org/officeDocument/2006/relationships" xmlns:p="http://schemas.openxmlformats.org/presentationml/2006/main">
+  <p:cSld>
+    <p:spTree>
+      <p:nvGrpSpPr>
+        <p:cNvPr id="1" name=""/>
+        <p:cNvGrpSpPr/>
+        <p:nvPr/>
+      </p:nvGrpSpPr>
+      <p:grpSpPr>
+        <a:xfrm>
+          <a:off x="0" y="0"/>
+          <a:ext cx="0" cy="0"/>
+          <a:chOff x="0" y="0"/>
+          <a:chExt cx="0" cy="0"/>
+        </a:xfrm>
+      </p:grpSpPr>
+      <p:sp>
+        <p:nvSpPr>
+          <p:cNvPr id="5" name="Title 1"/>
+          <p:cNvSpPr>
+            <a:spLocks noGrp="1"/>
+          </p:cNvSpPr>
+          <p:nvPr>
+            <p:ph type="title"/>
+          </p:nvPr>
+        </p:nvSpPr>
+        <p:spPr>
+          <a:xfrm>
+            <a:off x="457200" y="274638"/>
+            <a:ext cx="8229600" cy="1143000"/>
+          </a:xfrm>
+        </p:spPr>
+        <p:txBody>
+          <a:bodyPr>
+            <a:normAutofit/>
+          </a:bodyPr>
+          <a:lstStyle/>
+          <a:p>
+            <a:r>
+              <a:rPr lang="en-US" i="1" dirty="0" smtClean="0"/>
+              <a:t>RCL.PL.MOP2</a:t>
+            </a:r>
+            <a:endParaRPr lang="en-US" i="1" dirty="0"/>
+          </a:p>
+        </p:txBody>
+      </p:sp>
+      <p:graphicFrame>
+        <p:nvGraphicFramePr>
+          <p:cNvPr id="6" name="Content Placeholder 3"/>
+          <p:cNvGraphicFramePr>
+            <a:graphicFrameLocks noGrp="1"/>
+          </p:cNvGraphicFramePr>
+          <p:nvPr>
+            <p:ph idx="1"/>
+            <p:extLst>
+              <p:ext uri="{D42A27DB-BD31-4B8C-83A1-F6EECF244321}">
+                <p14:modId xmlns:p14="http://schemas.microsoft.com/office/powerpoint/2010/main" val="1897762007"/>
+              </p:ext>
+            </p:extLst>
+          </p:nvPr>
+        </p:nvGraphicFramePr>
+        <p:xfrm>
+          <a:off x="457200" y="1371600"/>
+          <a:ext cx="8229600" cy="1381760"/>
+        </p:xfrm>
+        <a:graphic>
+          <a:graphicData uri="http://schemas.openxmlformats.org/drawingml/2006/table">
+            <a:tbl>
+              <a:tblPr firstRow="1" bandRow="1">
+                <a:tableStyleId>{5C22544A-7EE6-4342-B048-85BDC9FD1C3A}</a:tableStyleId>
+              </a:tblPr>
+              <a:tblGrid>
+                <a:gridCol w="3200400"/>
+                <a:gridCol w="5029200"/>
+              </a:tblGrid>
+              <a:tr h="370840">
+                <a:tc>
+                  <a:txBody>
+                    <a:bodyPr/>
+                    <a:lstStyle/>
+                    <a:p>
+                      <a:r>
+                        <a:rPr lang="en-US" b="0" dirty="0" smtClean="0">
+                          <a:solidFill>
+                            <a:schemeClr val="bg1"/>
+                          </a:solidFill>
+                        </a:rPr>
+                        <a:t> RVM Requirement Number</a:t>
+                      </a:r>
+                      <a:endParaRPr lang="en-US" b="0" dirty="0">
+                        <a:solidFill>
+                          <a:schemeClr val="bg1"/>
+                        </a:solidFill>
+                      </a:endParaRPr>
+                    </a:p>
+                  </a:txBody>
+                  <a:tcPr anchor="ctr">
+                    <a:lnL w="12700" cap="flat" cmpd="sng" algn="ctr">
+                      <a:solidFill>
+                        <a:schemeClr val="tx1"/>
+                      </a:solidFill>
+                      <a:prstDash val="solid"/>
+                      <a:round/>
+                      <a:headEnd type="none" w="med" len="med"/>
+                      <a:tailEnd type="none" w="med" len="med"/>
+                    </a:lnL>
+                    <a:lnR w="12700" cap="flat" cmpd="sng" algn="ctr">
+                      <a:solidFill>
+                        <a:schemeClr val="tx1"/>
+                      </a:solidFill>
+                      <a:prstDash val="solid"/>
+                      <a:round/>
+                      <a:headEnd type="none" w="med" len="med"/>
+                      <a:tailEnd type="none" w="med" len="med"/>
+                    </a:lnR>
+                    <a:lnT w="12700" cap="flat" cmpd="sng" algn="ctr">
+                      <a:solidFill>
+                        <a:schemeClr val="tx1"/>
+                      </a:solidFill>
+                      <a:prstDash val="solid"/>
+                      <a:round/>
+                      <a:headEnd type="none" w="med" len="med"/>
+                      <a:tailEnd type="none" w="med" len="med"/>
+                    </a:lnT>
+                    <a:lnB w="12700" cap="flat" cmpd="sng" algn="ctr">
+                      <a:solidFill>
+                        <a:schemeClr val="tx1"/>
+                      </a:solidFill>
+                      <a:prstDash val="solid"/>
+                      <a:round/>
+                      <a:headEnd type="none" w="med" len="med"/>
+                      <a:tailEnd type="none" w="med" len="med"/>
+                    </a:lnB>
+                    <a:solidFill>
+                      <a:schemeClr val="tx2">
+                        <a:lumMod val="75000"/>
+                      </a:schemeClr>
+                    </a:solidFill>
+                  </a:tcPr>
+                </a:tc>
+                <a:tc>
+                  <a:txBody>
+                    <a:bodyPr/>
+                    <a:lstStyle/>
+                    <a:p>
+                      <a:r>
+                        <a:rPr lang="en-US" b="1" dirty="0" smtClean="0">
+                          <a:solidFill>
+                            <a:schemeClr val="tx1"/>
+                          </a:solidFill>
+                        </a:rPr>
+                        <a:t>MOP2</a:t>
+                      </a:r>
+                      <a:endParaRPr lang="en-US" b="1" dirty="0">
+                        <a:solidFill>
+                          <a:schemeClr val="tx1"/>
+                        </a:solidFill>
+                      </a:endParaRPr>
+                    </a:p>
+                  </a:txBody>
+                  <a:tcPr>
+                    <a:lnL w="12700" cap="flat" cmpd="sng" algn="ctr">
+                      <a:solidFill>
+                        <a:schemeClr val="tx1"/>
+                      </a:solidFill>
+                      <a:prstDash val="solid"/>
+                      <a:round/>
+                      <a:headEnd type="none" w="med" len="med"/>
+                      <a:tailEnd type="none" w="med" len="med"/>
+                    </a:lnL>
+                    <a:lnR w="12700" cap="flat" cmpd="sng" algn="ctr">
+                      <a:solidFill>
+                        <a:schemeClr val="tx1"/>
+                      </a:solidFill>
+                      <a:prstDash val="solid"/>
+                      <a:round/>
+                      <a:headEnd type="none" w="med" len="med"/>
+                      <a:tailEnd type="none" w="med" len="med"/>
+                    </a:lnR>
+                    <a:lnT w="12700" cap="flat" cmpd="sng" algn="ctr">
+                      <a:solidFill>
+                        <a:schemeClr val="tx1"/>
+                      </a:solidFill>
+                      <a:prstDash val="solid"/>
+                      <a:round/>
+                      <a:headEnd type="none" w="med" len="med"/>
+                      <a:tailEnd type="none" w="med" len="med"/>
+                    </a:lnT>
+                    <a:lnB w="12700" cap="flat" cmpd="sng" algn="ctr">
+                      <a:solidFill>
+                        <a:schemeClr val="tx1"/>
+                      </a:solidFill>
+                      <a:prstDash val="solid"/>
+                      <a:round/>
+                      <a:headEnd type="none" w="med" len="med"/>
+                      <a:tailEnd type="none" w="med" len="med"/>
+                    </a:lnB>
+                    <a:solidFill>
+                      <a:schemeClr val="tx2">
+                        <a:lumMod val="40000"/>
+                        <a:lumOff val="60000"/>
+                      </a:schemeClr>
+                    </a:solidFill>
+                  </a:tcPr>
+                </a:tc>
+              </a:tr>
+              <a:tr h="370840">
+                <a:tc>
+                  <a:txBody>
+                    <a:bodyPr/>
+                    <a:lstStyle/>
+                    <a:p>
+                      <a:r>
+                        <a:rPr lang="en-US" b="0" dirty="0" smtClean="0">
+                          <a:solidFill>
+                            <a:schemeClr val="bg1"/>
+                          </a:solidFill>
+                        </a:rPr>
+                        <a:t>RVM </a:t>
+                      </a:r>
+                      <a:r>
+                        <a:rPr lang="en-US" b="0" baseline="0" dirty="0" smtClean="0">
+                          <a:solidFill>
+                            <a:schemeClr val="bg1"/>
+                          </a:solidFill>
+                        </a:rPr>
+                        <a:t>Requirement Wording</a:t>
+                      </a:r>
+                      <a:endParaRPr lang="en-US" b="0" dirty="0">
+                        <a:solidFill>
+                          <a:schemeClr val="bg1"/>
+                        </a:solidFill>
+                      </a:endParaRPr>
+                    </a:p>
+                  </a:txBody>
+                  <a:tcPr anchor="ctr">
+                    <a:lnL w="12700" cap="flat" cmpd="sng" algn="ctr">
+                      <a:solidFill>
+                        <a:schemeClr val="tx1"/>
+                      </a:solidFill>
+                      <a:prstDash val="solid"/>
+                      <a:round/>
+                      <a:headEnd type="none" w="med" len="med"/>
+                      <a:tailEnd type="none" w="med" len="med"/>
+                    </a:lnL>
+                    <a:lnR w="12700" cap="flat" cmpd="sng" algn="ctr">
+                      <a:solidFill>
+                        <a:schemeClr val="tx1"/>
+                      </a:solidFill>
+                      <a:prstDash val="solid"/>
+                      <a:round/>
+                      <a:headEnd type="none" w="med" len="med"/>
+                      <a:tailEnd type="none" w="med" len="med"/>
+                    </a:lnR>
+                    <a:lnT w="12700" cap="flat" cmpd="sng" algn="ctr">
+                      <a:solidFill>
+                        <a:schemeClr val="tx1"/>
+                      </a:solidFill>
+                      <a:prstDash val="solid"/>
+                      <a:round/>
+                      <a:headEnd type="none" w="med" len="med"/>
+                      <a:tailEnd type="none" w="med" len="med"/>
+                    </a:lnT>
+                    <a:lnB w="12700" cap="flat" cmpd="sng" algn="ctr">
+                      <a:solidFill>
+                        <a:schemeClr val="tx1"/>
+                      </a:solidFill>
+                      <a:prstDash val="solid"/>
+                      <a:round/>
+                      <a:headEnd type="none" w="med" len="med"/>
+                      <a:tailEnd type="none" w="med" len="med"/>
+                    </a:lnB>
+                    <a:solidFill>
+                      <a:schemeClr val="tx2">
+                        <a:lumMod val="75000"/>
+                      </a:schemeClr>
+                    </a:solidFill>
+                  </a:tcPr>
+                </a:tc>
+                <a:tc>
+                  <a:txBody>
+                    <a:bodyPr/>
+                    <a:lstStyle/>
+                    <a:p>
+                      <a:r>
+                        <a:rPr lang="en-US" b="1" dirty="0" smtClean="0">
+                          <a:solidFill>
+                            <a:schemeClr val="tx1"/>
+                          </a:solidFill>
+                        </a:rPr>
+                        <a:t>The CubeSat must deorbit within 25 years of being launched</a:t>
+                      </a:r>
+                      <a:endParaRPr lang="en-US" b="1" dirty="0">
+                        <a:solidFill>
+                          <a:schemeClr val="tx1"/>
+                        </a:solidFill>
+                      </a:endParaRPr>
+                    </a:p>
+                  </a:txBody>
+                  <a:tcPr>
+                    <a:lnL w="12700" cap="flat" cmpd="sng" algn="ctr">
+                      <a:solidFill>
+                        <a:schemeClr val="tx1"/>
+                      </a:solidFill>
+                      <a:prstDash val="solid"/>
+                      <a:round/>
+                      <a:headEnd type="none" w="med" len="med"/>
+                      <a:tailEnd type="none" w="med" len="med"/>
+                    </a:lnL>
+                    <a:lnR w="12700" cap="flat" cmpd="sng" algn="ctr">
+                      <a:solidFill>
+                        <a:schemeClr val="tx1"/>
+                      </a:solidFill>
+                      <a:prstDash val="solid"/>
+                      <a:round/>
+                      <a:headEnd type="none" w="med" len="med"/>
+                      <a:tailEnd type="none" w="med" len="med"/>
+                    </a:lnR>
+                    <a:lnT w="12700" cap="flat" cmpd="sng" algn="ctr">
+                      <a:solidFill>
+                        <a:schemeClr val="tx1"/>
+                      </a:solidFill>
+                      <a:prstDash val="solid"/>
+                      <a:round/>
+                      <a:headEnd type="none" w="med" len="med"/>
+                      <a:tailEnd type="none" w="med" len="med"/>
+                    </a:lnT>
+                    <a:lnB w="12700" cap="flat" cmpd="sng" algn="ctr">
+                      <a:solidFill>
+                        <a:schemeClr val="tx1"/>
+                      </a:solidFill>
+                      <a:prstDash val="solid"/>
+                      <a:round/>
+                      <a:headEnd type="none" w="med" len="med"/>
+                      <a:tailEnd type="none" w="med" len="med"/>
+                    </a:lnB>
+                    <a:solidFill>
+                      <a:schemeClr val="tx2">
+                        <a:lumMod val="40000"/>
+                        <a:lumOff val="60000"/>
+                      </a:schemeClr>
+                    </a:solidFill>
+                  </a:tcPr>
+                </a:tc>
+              </a:tr>
+              <a:tr h="370840">
+                <a:tc>
+                  <a:txBody>
+                    <a:bodyPr/>
+                    <a:lstStyle/>
+                    <a:p>
+                      <a:r>
+                        <a:rPr lang="en-US" b="0" dirty="0" smtClean="0">
+                          <a:solidFill>
+                            <a:schemeClr val="bg1"/>
+                          </a:solidFill>
+                        </a:rPr>
+                        <a:t>Validation Method</a:t>
+                      </a:r>
+                      <a:endParaRPr lang="en-US" b="0" dirty="0">
+                        <a:solidFill>
+                          <a:schemeClr val="bg1"/>
+                        </a:solidFill>
+                      </a:endParaRPr>
+                    </a:p>
+                  </a:txBody>
+                  <a:tcPr anchor="ctr">
+                    <a:lnL w="12700" cap="flat" cmpd="sng" algn="ctr">
+                      <a:solidFill>
+                        <a:schemeClr val="tx1"/>
+                      </a:solidFill>
+                      <a:prstDash val="solid"/>
+                      <a:round/>
+                      <a:headEnd type="none" w="med" len="med"/>
+                      <a:tailEnd type="none" w="med" len="med"/>
+                    </a:lnL>
+                    <a:lnR w="12700" cap="flat" cmpd="sng" algn="ctr">
+                      <a:solidFill>
+                        <a:schemeClr val="tx1"/>
+                      </a:solidFill>
+                      <a:prstDash val="solid"/>
+                      <a:round/>
+                      <a:headEnd type="none" w="med" len="med"/>
+                      <a:tailEnd type="none" w="med" len="med"/>
+                    </a:lnR>
+                    <a:lnT w="12700" cap="flat" cmpd="sng" algn="ctr">
+                      <a:solidFill>
+                        <a:schemeClr val="tx1"/>
+                      </a:solidFill>
+                      <a:prstDash val="solid"/>
+                      <a:round/>
+                      <a:headEnd type="none" w="med" len="med"/>
+                      <a:tailEnd type="none" w="med" len="med"/>
+                    </a:lnT>
+                    <a:lnB w="12700" cap="flat" cmpd="sng" algn="ctr">
+                      <a:solidFill>
+                        <a:schemeClr val="tx1"/>
+                      </a:solidFill>
+                      <a:prstDash val="solid"/>
+                      <a:round/>
+                      <a:headEnd type="none" w="med" len="med"/>
+                      <a:tailEnd type="none" w="med" len="med"/>
+                    </a:lnB>
+                    <a:solidFill>
+                      <a:schemeClr val="tx2">
+                        <a:lumMod val="75000"/>
+                      </a:schemeClr>
+                    </a:solidFill>
+                  </a:tcPr>
+                </a:tc>
+                <a:tc>
+                  <a:txBody>
+                    <a:bodyPr/>
+                    <a:lstStyle/>
+                    <a:p>
+                      <a:r>
+                        <a:rPr lang="en-US" b="1" i="1" dirty="0" smtClean="0">
+                          <a:solidFill>
+                            <a:schemeClr val="tx1"/>
+                          </a:solidFill>
+                        </a:rPr>
+                        <a:t>Analysis</a:t>
+                      </a:r>
+                      <a:endParaRPr lang="en-US" b="1" i="1" dirty="0">
+                        <a:solidFill>
+                          <a:schemeClr val="tx1"/>
+                        </a:solidFill>
+                      </a:endParaRPr>
+                    </a:p>
+                  </a:txBody>
+                  <a:tcPr>
+                    <a:lnL w="12700" cap="flat" cmpd="sng" algn="ctr">
+                      <a:solidFill>
+                        <a:schemeClr val="tx1"/>
+                      </a:solidFill>
+                      <a:prstDash val="solid"/>
+                      <a:round/>
+                      <a:headEnd type="none" w="med" len="med"/>
+                      <a:tailEnd type="none" w="med" len="med"/>
+                    </a:lnL>
+                    <a:lnR w="12700" cap="flat" cmpd="sng" algn="ctr">
+                      <a:solidFill>
+                        <a:schemeClr val="tx1"/>
+                      </a:solidFill>
+                      <a:prstDash val="solid"/>
+                      <a:round/>
+                      <a:headEnd type="none" w="med" len="med"/>
+                      <a:tailEnd type="none" w="med" len="med"/>
+                    </a:lnR>
+                    <a:lnT w="12700" cap="flat" cmpd="sng" algn="ctr">
+                      <a:solidFill>
+                        <a:schemeClr val="tx1"/>
+                      </a:solidFill>
+                      <a:prstDash val="solid"/>
+                      <a:round/>
+                      <a:headEnd type="none" w="med" len="med"/>
+                      <a:tailEnd type="none" w="med" len="med"/>
+                    </a:lnT>
+                    <a:lnB w="12700" cap="flat" cmpd="sng" algn="ctr">
+                      <a:solidFill>
+                        <a:schemeClr val="tx1"/>
+                      </a:solidFill>
+                      <a:prstDash val="solid"/>
+                      <a:round/>
+                      <a:headEnd type="none" w="med" len="med"/>
+                      <a:tailEnd type="none" w="med" len="med"/>
+                    </a:lnB>
+                    <a:solidFill>
+                      <a:schemeClr val="tx2">
+                        <a:lumMod val="40000"/>
+                        <a:lumOff val="60000"/>
+                      </a:schemeClr>
+                    </a:solidFill>
+                  </a:tcPr>
+                </a:tc>
+              </a:tr>
+            </a:tbl>
+          </a:graphicData>
+        </a:graphic>
+      </p:graphicFrame>
+      <p:sp>
+        <p:nvSpPr>
+          <p:cNvPr id="7" name="TextBox 6"/>
+          <p:cNvSpPr txBox="1"/>
+          <p:nvPr/>
+        </p:nvSpPr>
+        <p:spPr>
+          <a:xfrm>
+            <a:off x="381000" y="3676471"/>
+            <a:ext cx="8305800" cy="1569660"/>
+          </a:xfrm>
+          <a:prstGeom prst="rect">
+            <a:avLst/>
+          </a:prstGeom>
+          <a:noFill/>
+        </p:spPr>
+        <p:txBody>
+          <a:bodyPr wrap="square" rtlCol="0">
+            <a:spAutoFit/>
+          </a:bodyPr>
+          <a:lstStyle/>
+          <a:p>
+            <a:r>
+              <a:rPr lang="en-US" sz="2400" b="1" i="1" dirty="0" smtClean="0"/>
+              <a:t>Met by performing an orbital analysis using orbital parameters for various altitudes to determine orbital lifetime. If the orbital lifetime exceeds 25 years, a deorbit mechanis</a:t>
+            </a:r>
+            <a:r>
+              <a:rPr lang="en-US" sz="2400" b="1" i="1" dirty="0" smtClean="0"/>
+              <a:t>m will be included in the design.</a:t>
+            </a:r>
+            <a:endParaRPr lang="en-US" sz="2400" b="1" i="1" dirty="0"/>
+          </a:p>
+        </p:txBody>
+      </p:sp>
+    </p:spTree>
+    <p:extLst>
+      <p:ext uri="{BB962C8B-B14F-4D97-AF65-F5344CB8AC3E}">
+        <p14:creationId xmlns:p14="http://schemas.microsoft.com/office/powerpoint/2010/main" val="3919620384"/>
+      </p:ext>
+    </p:extLst>
+  </p:cSld>
+  <p:clrMapOvr>
+    <a:masterClrMapping/>
+  </p:clrMapOvr>
+</p:sld>
+</file>
+
+<file path=ppt/slides/slide7.xml><?xml version="1.0" encoding="utf-8"?>
+<p:sld xmlns:a="http://schemas.openxmlformats.org/drawingml/2006/main" xmlns:r="http://schemas.openxmlformats.org/officeDocument/2006/relationships" xmlns:p="http://schemas.openxmlformats.org/presentationml/2006/main">
+  <p:cSld>
+    <p:spTree>
+      <p:nvGrpSpPr>
+        <p:cNvPr id="1" name=""/>
+        <p:cNvGrpSpPr/>
+        <p:nvPr/>
+      </p:nvGrpSpPr>
+      <p:grpSpPr>
+        <a:xfrm>
+          <a:off x="0" y="0"/>
+          <a:ext cx="0" cy="0"/>
+          <a:chOff x="0" y="0"/>
+          <a:chExt cx="0" cy="0"/>
+        </a:xfrm>
+      </p:grpSpPr>
+      <p:sp>
+        <p:nvSpPr>
+          <p:cNvPr id="5" name="Title 1"/>
+          <p:cNvSpPr>
+            <a:spLocks noGrp="1"/>
+          </p:cNvSpPr>
+          <p:nvPr>
+            <p:ph type="title"/>
+          </p:nvPr>
+        </p:nvSpPr>
+        <p:spPr>
+          <a:xfrm>
+            <a:off x="457200" y="274638"/>
+            <a:ext cx="8229600" cy="1143000"/>
+          </a:xfrm>
+        </p:spPr>
+        <p:txBody>
+          <a:bodyPr>
+            <a:normAutofit/>
+          </a:bodyPr>
+          <a:lstStyle/>
+          <a:p>
+            <a:r>
+              <a:rPr lang="en-US" i="1" dirty="0" smtClean="0"/>
+              <a:t>RCL.PL.STR5</a:t>
+            </a:r>
+            <a:endParaRPr lang="en-US" i="1" dirty="0"/>
+          </a:p>
+        </p:txBody>
+      </p:sp>
+      <p:graphicFrame>
+        <p:nvGraphicFramePr>
+          <p:cNvPr id="6" name="Content Placeholder 3"/>
+          <p:cNvGraphicFramePr>
+            <a:graphicFrameLocks noGrp="1"/>
+          </p:cNvGraphicFramePr>
+          <p:nvPr>
+            <p:ph idx="1"/>
+            <p:extLst>
+              <p:ext uri="{D42A27DB-BD31-4B8C-83A1-F6EECF244321}">
+                <p14:modId xmlns:p14="http://schemas.microsoft.com/office/powerpoint/2010/main" val="4177955595"/>
+              </p:ext>
+            </p:extLst>
+          </p:nvPr>
+        </p:nvGraphicFramePr>
+        <p:xfrm>
+          <a:off x="457200" y="1371600"/>
+          <a:ext cx="8229600" cy="1381760"/>
+        </p:xfrm>
+        <a:graphic>
+          <a:graphicData uri="http://schemas.openxmlformats.org/drawingml/2006/table">
+            <a:tbl>
+              <a:tblPr firstRow="1" bandRow="1">
+                <a:tableStyleId>{5C22544A-7EE6-4342-B048-85BDC9FD1C3A}</a:tableStyleId>
+              </a:tblPr>
+              <a:tblGrid>
+                <a:gridCol w="3200400"/>
+                <a:gridCol w="5029200"/>
+              </a:tblGrid>
+              <a:tr h="370840">
+                <a:tc>
+                  <a:txBody>
+                    <a:bodyPr/>
+                    <a:lstStyle/>
+                    <a:p>
+                      <a:r>
+                        <a:rPr lang="en-US" b="0" dirty="0" smtClean="0">
+                          <a:solidFill>
+                            <a:schemeClr val="bg1"/>
+                          </a:solidFill>
+                        </a:rPr>
+                        <a:t> RVM Requirement Number</a:t>
+                      </a:r>
+                      <a:endParaRPr lang="en-US" b="0" dirty="0">
+                        <a:solidFill>
+                          <a:schemeClr val="bg1"/>
+                        </a:solidFill>
+                      </a:endParaRPr>
+                    </a:p>
+                  </a:txBody>
+                  <a:tcPr anchor="ctr">
+                    <a:lnL w="12700" cap="flat" cmpd="sng" algn="ctr">
+                      <a:solidFill>
+                        <a:schemeClr val="tx1"/>
+                      </a:solidFill>
+                      <a:prstDash val="solid"/>
+                      <a:round/>
+                      <a:headEnd type="none" w="med" len="med"/>
+                      <a:tailEnd type="none" w="med" len="med"/>
+                    </a:lnL>
+                    <a:lnR w="12700" cap="flat" cmpd="sng" algn="ctr">
+                      <a:solidFill>
+                        <a:schemeClr val="tx1"/>
+                      </a:solidFill>
+                      <a:prstDash val="solid"/>
+                      <a:round/>
+                      <a:headEnd type="none" w="med" len="med"/>
+                      <a:tailEnd type="none" w="med" len="med"/>
+                    </a:lnR>
+                    <a:lnT w="12700" cap="flat" cmpd="sng" algn="ctr">
+                      <a:solidFill>
+                        <a:schemeClr val="tx1"/>
+                      </a:solidFill>
+                      <a:prstDash val="solid"/>
+                      <a:round/>
+                      <a:headEnd type="none" w="med" len="med"/>
+                      <a:tailEnd type="none" w="med" len="med"/>
+                    </a:lnT>
+                    <a:lnB w="12700" cap="flat" cmpd="sng" algn="ctr">
+                      <a:solidFill>
+                        <a:schemeClr val="tx1"/>
+                      </a:solidFill>
+                      <a:prstDash val="solid"/>
+                      <a:round/>
+                      <a:headEnd type="none" w="med" len="med"/>
+                      <a:tailEnd type="none" w="med" len="med"/>
+                    </a:lnB>
+                    <a:solidFill>
+                      <a:schemeClr val="tx2">
+                        <a:lumMod val="75000"/>
+                      </a:schemeClr>
+                    </a:solidFill>
+                  </a:tcPr>
+                </a:tc>
+                <a:tc>
+                  <a:txBody>
+                    <a:bodyPr/>
+                    <a:lstStyle/>
+                    <a:p>
+                      <a:r>
+                        <a:rPr lang="en-US" b="1" dirty="0" smtClean="0">
+                          <a:solidFill>
+                            <a:schemeClr val="tx1"/>
+                          </a:solidFill>
+                        </a:rPr>
+                        <a:t>STR5</a:t>
+                      </a:r>
+                      <a:endParaRPr lang="en-US" b="1" dirty="0">
+                        <a:solidFill>
+                          <a:schemeClr val="tx1"/>
+                        </a:solidFill>
+                      </a:endParaRPr>
+                    </a:p>
+                  </a:txBody>
+                  <a:tcPr>
+                    <a:lnL w="12700" cap="flat" cmpd="sng" algn="ctr">
+                      <a:solidFill>
+                        <a:schemeClr val="tx1"/>
+                      </a:solidFill>
+                      <a:prstDash val="solid"/>
+                      <a:round/>
+                      <a:headEnd type="none" w="med" len="med"/>
+                      <a:tailEnd type="none" w="med" len="med"/>
+                    </a:lnL>
+                    <a:lnR w="12700" cap="flat" cmpd="sng" algn="ctr">
+                      <a:solidFill>
+                        <a:schemeClr val="tx1"/>
+                      </a:solidFill>
+                      <a:prstDash val="solid"/>
+                      <a:round/>
+                      <a:headEnd type="none" w="med" len="med"/>
+                      <a:tailEnd type="none" w="med" len="med"/>
+                    </a:lnR>
+                    <a:lnT w="12700" cap="flat" cmpd="sng" algn="ctr">
+                      <a:solidFill>
+                        <a:schemeClr val="tx1"/>
+                      </a:solidFill>
+                      <a:prstDash val="solid"/>
+                      <a:round/>
+                      <a:headEnd type="none" w="med" len="med"/>
+                      <a:tailEnd type="none" w="med" len="med"/>
+                    </a:lnT>
+                    <a:lnB w="12700" cap="flat" cmpd="sng" algn="ctr">
+                      <a:solidFill>
+                        <a:schemeClr val="tx1"/>
+                      </a:solidFill>
+                      <a:prstDash val="solid"/>
+                      <a:round/>
+                      <a:headEnd type="none" w="med" len="med"/>
+                      <a:tailEnd type="none" w="med" len="med"/>
+                    </a:lnB>
+                    <a:solidFill>
+                      <a:schemeClr val="tx2">
+                        <a:lumMod val="40000"/>
+                        <a:lumOff val="60000"/>
+                      </a:schemeClr>
+                    </a:solidFill>
+                  </a:tcPr>
+                </a:tc>
+              </a:tr>
+              <a:tr h="370840">
+                <a:tc>
+                  <a:txBody>
+                    <a:bodyPr/>
+                    <a:lstStyle/>
+                    <a:p>
+                      <a:r>
+                        <a:rPr lang="en-US" b="0" dirty="0" smtClean="0">
+                          <a:solidFill>
+                            <a:schemeClr val="bg1"/>
+                          </a:solidFill>
+                        </a:rPr>
+                        <a:t>RVM </a:t>
+                      </a:r>
+                      <a:r>
+                        <a:rPr lang="en-US" b="0" baseline="0" dirty="0" smtClean="0">
+                          <a:solidFill>
+                            <a:schemeClr val="bg1"/>
+                          </a:solidFill>
+                        </a:rPr>
+                        <a:t>Requirement Wording</a:t>
+                      </a:r>
+                      <a:endParaRPr lang="en-US" b="0" dirty="0">
+                        <a:solidFill>
+                          <a:schemeClr val="bg1"/>
+                        </a:solidFill>
+                      </a:endParaRPr>
+                    </a:p>
+                  </a:txBody>
+                  <a:tcPr anchor="ctr">
+                    <a:lnL w="12700" cap="flat" cmpd="sng" algn="ctr">
+                      <a:solidFill>
+                        <a:schemeClr val="tx1"/>
+                      </a:solidFill>
+                      <a:prstDash val="solid"/>
+                      <a:round/>
+                      <a:headEnd type="none" w="med" len="med"/>
+                      <a:tailEnd type="none" w="med" len="med"/>
+                    </a:lnL>
+                    <a:lnR w="12700" cap="flat" cmpd="sng" algn="ctr">
+                      <a:solidFill>
+                        <a:schemeClr val="tx1"/>
+                      </a:solidFill>
+                      <a:prstDash val="solid"/>
+                      <a:round/>
+                      <a:headEnd type="none" w="med" len="med"/>
+                      <a:tailEnd type="none" w="med" len="med"/>
+                    </a:lnR>
+                    <a:lnT w="12700" cap="flat" cmpd="sng" algn="ctr">
+                      <a:solidFill>
+                        <a:schemeClr val="tx1"/>
+                      </a:solidFill>
+                      <a:prstDash val="solid"/>
+                      <a:round/>
+                      <a:headEnd type="none" w="med" len="med"/>
+                      <a:tailEnd type="none" w="med" len="med"/>
+                    </a:lnT>
+                    <a:lnB w="12700" cap="flat" cmpd="sng" algn="ctr">
+                      <a:solidFill>
+                        <a:schemeClr val="tx1"/>
+                      </a:solidFill>
+                      <a:prstDash val="solid"/>
+                      <a:round/>
+                      <a:headEnd type="none" w="med" len="med"/>
+                      <a:tailEnd type="none" w="med" len="med"/>
+                    </a:lnB>
+                    <a:solidFill>
+                      <a:schemeClr val="tx2">
+                        <a:lumMod val="75000"/>
+                      </a:schemeClr>
+                    </a:solidFill>
+                  </a:tcPr>
+                </a:tc>
+                <a:tc>
+                  <a:txBody>
+                    <a:bodyPr/>
+                    <a:lstStyle/>
+                    <a:p>
+                      <a:r>
+                        <a:rPr lang="en-US" b="1" dirty="0" smtClean="0">
+                          <a:solidFill>
+                            <a:schemeClr val="tx1"/>
+                          </a:solidFill>
+                        </a:rPr>
+                        <a:t>The CubeSat system shall be conjoined prior to launch vehicle integration</a:t>
+                      </a:r>
+                      <a:endParaRPr lang="en-US" b="1" dirty="0">
+                        <a:solidFill>
+                          <a:schemeClr val="tx1"/>
+                        </a:solidFill>
+                      </a:endParaRPr>
+                    </a:p>
+                  </a:txBody>
+                  <a:tcPr>
+                    <a:lnL w="12700" cap="flat" cmpd="sng" algn="ctr">
+                      <a:solidFill>
+                        <a:schemeClr val="tx1"/>
+                      </a:solidFill>
+                      <a:prstDash val="solid"/>
+                      <a:round/>
+                      <a:headEnd type="none" w="med" len="med"/>
+                      <a:tailEnd type="none" w="med" len="med"/>
+                    </a:lnL>
+                    <a:lnR w="12700" cap="flat" cmpd="sng" algn="ctr">
+                      <a:solidFill>
+                        <a:schemeClr val="tx1"/>
+                      </a:solidFill>
+                      <a:prstDash val="solid"/>
+                      <a:round/>
+                      <a:headEnd type="none" w="med" len="med"/>
+                      <a:tailEnd type="none" w="med" len="med"/>
+                    </a:lnR>
+                    <a:lnT w="12700" cap="flat" cmpd="sng" algn="ctr">
+                      <a:solidFill>
+                        <a:schemeClr val="tx1"/>
+                      </a:solidFill>
+                      <a:prstDash val="solid"/>
+                      <a:round/>
+                      <a:headEnd type="none" w="med" len="med"/>
+                      <a:tailEnd type="none" w="med" len="med"/>
+                    </a:lnT>
+                    <a:lnB w="12700" cap="flat" cmpd="sng" algn="ctr">
+                      <a:solidFill>
+                        <a:schemeClr val="tx1"/>
+                      </a:solidFill>
+                      <a:prstDash val="solid"/>
+                      <a:round/>
+                      <a:headEnd type="none" w="med" len="med"/>
+                      <a:tailEnd type="none" w="med" len="med"/>
+                    </a:lnB>
+                    <a:solidFill>
+                      <a:schemeClr val="tx2">
+                        <a:lumMod val="40000"/>
+                        <a:lumOff val="60000"/>
+                      </a:schemeClr>
+                    </a:solidFill>
+                  </a:tcPr>
+                </a:tc>
+              </a:tr>
+              <a:tr h="370840">
+                <a:tc>
+                  <a:txBody>
+                    <a:bodyPr/>
+                    <a:lstStyle/>
+                    <a:p>
+                      <a:r>
+                        <a:rPr lang="en-US" b="0" dirty="0" smtClean="0">
+                          <a:solidFill>
+                            <a:schemeClr val="bg1"/>
+                          </a:solidFill>
+                        </a:rPr>
+                        <a:t>Validation Method</a:t>
+                      </a:r>
+                      <a:endParaRPr lang="en-US" b="0" dirty="0">
+                        <a:solidFill>
+                          <a:schemeClr val="bg1"/>
+                        </a:solidFill>
+                      </a:endParaRPr>
+                    </a:p>
+                  </a:txBody>
+                  <a:tcPr anchor="ctr">
+                    <a:lnL w="12700" cap="flat" cmpd="sng" algn="ctr">
+                      <a:solidFill>
+                        <a:schemeClr val="tx1"/>
+                      </a:solidFill>
+                      <a:prstDash val="solid"/>
+                      <a:round/>
+                      <a:headEnd type="none" w="med" len="med"/>
+                      <a:tailEnd type="none" w="med" len="med"/>
+                    </a:lnL>
+                    <a:lnR w="12700" cap="flat" cmpd="sng" algn="ctr">
+                      <a:solidFill>
+                        <a:schemeClr val="tx1"/>
+                      </a:solidFill>
+                      <a:prstDash val="solid"/>
+                      <a:round/>
+                      <a:headEnd type="none" w="med" len="med"/>
+                      <a:tailEnd type="none" w="med" len="med"/>
+                    </a:lnR>
+                    <a:lnT w="12700" cap="flat" cmpd="sng" algn="ctr">
+                      <a:solidFill>
+                        <a:schemeClr val="tx1"/>
+                      </a:solidFill>
+                      <a:prstDash val="solid"/>
+                      <a:round/>
+                      <a:headEnd type="none" w="med" len="med"/>
+                      <a:tailEnd type="none" w="med" len="med"/>
+                    </a:lnT>
+                    <a:lnB w="12700" cap="flat" cmpd="sng" algn="ctr">
+                      <a:solidFill>
+                        <a:schemeClr val="tx1"/>
+                      </a:solidFill>
+                      <a:prstDash val="solid"/>
+                      <a:round/>
+                      <a:headEnd type="none" w="med" len="med"/>
+                      <a:tailEnd type="none" w="med" len="med"/>
+                    </a:lnB>
+                    <a:solidFill>
+                      <a:schemeClr val="tx2">
+                        <a:lumMod val="75000"/>
+                      </a:schemeClr>
+                    </a:solidFill>
+                  </a:tcPr>
+                </a:tc>
+                <a:tc>
+                  <a:txBody>
+                    <a:bodyPr/>
+                    <a:lstStyle/>
+                    <a:p>
+                      <a:r>
+                        <a:rPr lang="en-US" b="1" i="1" dirty="0" smtClean="0">
+                          <a:solidFill>
+                            <a:schemeClr val="tx1"/>
+                          </a:solidFill>
+                        </a:rPr>
+                        <a:t>Demo</a:t>
+                      </a:r>
+                      <a:endParaRPr lang="en-US" b="1" i="1" dirty="0">
+                        <a:solidFill>
+                          <a:schemeClr val="tx1"/>
+                        </a:solidFill>
+                      </a:endParaRPr>
+                    </a:p>
+                  </a:txBody>
+                  <a:tcPr>
+                    <a:lnL w="12700" cap="flat" cmpd="sng" algn="ctr">
+                      <a:solidFill>
+                        <a:schemeClr val="tx1"/>
+                      </a:solidFill>
+                      <a:prstDash val="solid"/>
+                      <a:round/>
+                      <a:headEnd type="none" w="med" len="med"/>
+                      <a:tailEnd type="none" w="med" len="med"/>
+                    </a:lnL>
+                    <a:lnR w="12700" cap="flat" cmpd="sng" algn="ctr">
+                      <a:solidFill>
+                        <a:schemeClr val="tx1"/>
+                      </a:solidFill>
+                      <a:prstDash val="solid"/>
+                      <a:round/>
+                      <a:headEnd type="none" w="med" len="med"/>
+                      <a:tailEnd type="none" w="med" len="med"/>
+                    </a:lnR>
+                    <a:lnT w="12700" cap="flat" cmpd="sng" algn="ctr">
+                      <a:solidFill>
+                        <a:schemeClr val="tx1"/>
+                      </a:solidFill>
+                      <a:prstDash val="solid"/>
+                      <a:round/>
+                      <a:headEnd type="none" w="med" len="med"/>
+                      <a:tailEnd type="none" w="med" len="med"/>
+                    </a:lnT>
+                    <a:lnB w="12700" cap="flat" cmpd="sng" algn="ctr">
+                      <a:solidFill>
+                        <a:schemeClr val="tx1"/>
+                      </a:solidFill>
+                      <a:prstDash val="solid"/>
+                      <a:round/>
+                      <a:headEnd type="none" w="med" len="med"/>
+                      <a:tailEnd type="none" w="med" len="med"/>
+                    </a:lnB>
+                    <a:solidFill>
+                      <a:schemeClr val="tx2">
+                        <a:lumMod val="40000"/>
+                        <a:lumOff val="60000"/>
+                      </a:schemeClr>
+                    </a:solidFill>
+                  </a:tcPr>
+                </a:tc>
+              </a:tr>
+            </a:tbl>
+          </a:graphicData>
+        </a:graphic>
+      </p:graphicFrame>
+      <p:sp>
+        <p:nvSpPr>
+          <p:cNvPr id="7" name="TextBox 6"/>
+          <p:cNvSpPr txBox="1"/>
+          <p:nvPr/>
+        </p:nvSpPr>
+        <p:spPr>
+          <a:xfrm>
+            <a:off x="381000" y="3676471"/>
+            <a:ext cx="8305800" cy="1200329"/>
+          </a:xfrm>
+          <a:prstGeom prst="rect">
+            <a:avLst/>
+          </a:prstGeom>
+          <a:noFill/>
+        </p:spPr>
+        <p:txBody>
+          <a:bodyPr wrap="square" rtlCol="0">
+            <a:spAutoFit/>
+          </a:bodyPr>
+          <a:lstStyle/>
+          <a:p>
+            <a:r>
+              <a:rPr lang="en-US" sz="2400" b="1" i="1" dirty="0" smtClean="0"/>
+              <a:t>Met by conducting an separation test then an integrated vibration test of the flight unit prior to launch vehicle integration.</a:t>
+            </a:r>
+            <a:endParaRPr lang="en-US" sz="2400" b="1" i="1" dirty="0"/>
+          </a:p>
+        </p:txBody>
+      </p:sp>
+    </p:spTree>
+    <p:extLst>
+      <p:ext uri="{BB962C8B-B14F-4D97-AF65-F5344CB8AC3E}">
+        <p14:creationId xmlns:p14="http://schemas.microsoft.com/office/powerpoint/2010/main" val="1783788165"/>
+      </p:ext>
+    </p:extLst>
+  </p:cSld>
+  <p:clrMapOvr>
+    <a:masterClrMapping/>
+  </p:clrMapOvr>
+</p:sld>
+</file>
+
+<file path=ppt/slides/slide8.xml><?xml version="1.0" encoding="utf-8"?>
+<p:sld xmlns:a="http://schemas.openxmlformats.org/drawingml/2006/main" xmlns:r="http://schemas.openxmlformats.org/officeDocument/2006/relationships" xmlns:p="http://schemas.openxmlformats.org/presentationml/2006/main">
+  <p:cSld>
+    <p:spTree>
+      <p:nvGrpSpPr>
+        <p:cNvPr id="1" name=""/>
+        <p:cNvGrpSpPr/>
+        <p:nvPr/>
+      </p:nvGrpSpPr>
+      <p:grpSpPr>
+        <a:xfrm>
+          <a:off x="0" y="0"/>
+          <a:ext cx="0" cy="0"/>
+          <a:chOff x="0" y="0"/>
+          <a:chExt cx="0" cy="0"/>
+        </a:xfrm>
+      </p:grpSpPr>
+      <p:sp>
+        <p:nvSpPr>
+          <p:cNvPr id="5" name="Title 1"/>
+          <p:cNvSpPr>
+            <a:spLocks noGrp="1"/>
+          </p:cNvSpPr>
+          <p:nvPr>
+            <p:ph type="title"/>
+          </p:nvPr>
+        </p:nvSpPr>
+        <p:spPr>
+          <a:xfrm>
+            <a:off x="457200" y="274638"/>
+            <a:ext cx="8229600" cy="1143000"/>
+          </a:xfrm>
+        </p:spPr>
+        <p:txBody>
+          <a:bodyPr>
+            <a:normAutofit/>
+          </a:bodyPr>
+          <a:lstStyle/>
+          <a:p>
+            <a:r>
+              <a:rPr lang="en-US" i="1" dirty="0" smtClean="0"/>
+              <a:t>RCL.PL.STR6</a:t>
+            </a:r>
+            <a:endParaRPr lang="en-US" i="1" dirty="0"/>
+          </a:p>
+        </p:txBody>
+      </p:sp>
+      <p:graphicFrame>
+        <p:nvGraphicFramePr>
+          <p:cNvPr id="6" name="Content Placeholder 3"/>
+          <p:cNvGraphicFramePr>
+            <a:graphicFrameLocks noGrp="1"/>
+          </p:cNvGraphicFramePr>
+          <p:nvPr>
+            <p:ph idx="1"/>
+            <p:extLst>
+              <p:ext uri="{D42A27DB-BD31-4B8C-83A1-F6EECF244321}">
+                <p14:modId xmlns:p14="http://schemas.microsoft.com/office/powerpoint/2010/main" val="2890384289"/>
+              </p:ext>
+            </p:extLst>
+          </p:nvPr>
+        </p:nvGraphicFramePr>
+        <p:xfrm>
+          <a:off x="457200" y="1371600"/>
+          <a:ext cx="8229600" cy="1381760"/>
+        </p:xfrm>
+        <a:graphic>
+          <a:graphicData uri="http://schemas.openxmlformats.org/drawingml/2006/table">
+            <a:tbl>
+              <a:tblPr firstRow="1" bandRow="1">
+                <a:tableStyleId>{5C22544A-7EE6-4342-B048-85BDC9FD1C3A}</a:tableStyleId>
+              </a:tblPr>
+              <a:tblGrid>
+                <a:gridCol w="3200400"/>
+                <a:gridCol w="5029200"/>
+              </a:tblGrid>
+              <a:tr h="370840">
+                <a:tc>
+                  <a:txBody>
+                    <a:bodyPr/>
+                    <a:lstStyle/>
+                    <a:p>
+                      <a:r>
+                        <a:rPr lang="en-US" b="0" dirty="0" smtClean="0">
+                          <a:solidFill>
+                            <a:schemeClr val="bg1"/>
+                          </a:solidFill>
+                        </a:rPr>
+                        <a:t> RVM Requirement Number</a:t>
+                      </a:r>
+                      <a:endParaRPr lang="en-US" b="0" dirty="0">
+                        <a:solidFill>
+                          <a:schemeClr val="bg1"/>
+                        </a:solidFill>
+                      </a:endParaRPr>
+                    </a:p>
+                  </a:txBody>
+                  <a:tcPr anchor="ctr">
+                    <a:lnL w="12700" cap="flat" cmpd="sng" algn="ctr">
+                      <a:solidFill>
+                        <a:schemeClr val="tx1"/>
+                      </a:solidFill>
+                      <a:prstDash val="solid"/>
+                      <a:round/>
+                      <a:headEnd type="none" w="med" len="med"/>
+                      <a:tailEnd type="none" w="med" len="med"/>
+                    </a:lnL>
+                    <a:lnR w="12700" cap="flat" cmpd="sng" algn="ctr">
+                      <a:solidFill>
+                        <a:schemeClr val="tx1"/>
+                      </a:solidFill>
+                      <a:prstDash val="solid"/>
+                      <a:round/>
+                      <a:headEnd type="none" w="med" len="med"/>
+                      <a:tailEnd type="none" w="med" len="med"/>
+                    </a:lnR>
+                    <a:lnT w="12700" cap="flat" cmpd="sng" algn="ctr">
+                      <a:solidFill>
+                        <a:schemeClr val="tx1"/>
+                      </a:solidFill>
+                      <a:prstDash val="solid"/>
+                      <a:round/>
+                      <a:headEnd type="none" w="med" len="med"/>
+                      <a:tailEnd type="none" w="med" len="med"/>
+                    </a:lnT>
+                    <a:lnB w="12700" cap="flat" cmpd="sng" algn="ctr">
+                      <a:solidFill>
+                        <a:schemeClr val="tx1"/>
+                      </a:solidFill>
+                      <a:prstDash val="solid"/>
+                      <a:round/>
+                      <a:headEnd type="none" w="med" len="med"/>
+                      <a:tailEnd type="none" w="med" len="med"/>
+                    </a:lnB>
+                    <a:solidFill>
+                      <a:schemeClr val="tx2">
+                        <a:lumMod val="75000"/>
+                      </a:schemeClr>
+                    </a:solidFill>
+                  </a:tcPr>
+                </a:tc>
+                <a:tc>
+                  <a:txBody>
+                    <a:bodyPr/>
+                    <a:lstStyle/>
+                    <a:p>
+                      <a:r>
+                        <a:rPr lang="en-US" b="1" smtClean="0">
+                          <a:solidFill>
+                            <a:schemeClr val="tx1"/>
+                          </a:solidFill>
+                        </a:rPr>
+                        <a:t>STR6</a:t>
+                      </a:r>
+                      <a:endParaRPr lang="en-US" b="1" dirty="0">
+                        <a:solidFill>
+                          <a:schemeClr val="tx1"/>
+                        </a:solidFill>
+                      </a:endParaRPr>
+                    </a:p>
+                  </a:txBody>
+                  <a:tcPr>
+                    <a:lnL w="12700" cap="flat" cmpd="sng" algn="ctr">
+                      <a:solidFill>
+                        <a:schemeClr val="tx1"/>
+                      </a:solidFill>
+                      <a:prstDash val="solid"/>
+                      <a:round/>
+                      <a:headEnd type="none" w="med" len="med"/>
+                      <a:tailEnd type="none" w="med" len="med"/>
+                    </a:lnL>
+                    <a:lnR w="12700" cap="flat" cmpd="sng" algn="ctr">
+                      <a:solidFill>
+                        <a:schemeClr val="tx1"/>
+                      </a:solidFill>
+                      <a:prstDash val="solid"/>
+                      <a:round/>
+                      <a:headEnd type="none" w="med" len="med"/>
+                      <a:tailEnd type="none" w="med" len="med"/>
+                    </a:lnR>
+                    <a:lnT w="12700" cap="flat" cmpd="sng" algn="ctr">
+                      <a:solidFill>
+                        <a:schemeClr val="tx1"/>
+                      </a:solidFill>
+                      <a:prstDash val="solid"/>
+                      <a:round/>
+                      <a:headEnd type="none" w="med" len="med"/>
+                      <a:tailEnd type="none" w="med" len="med"/>
+                    </a:lnT>
+                    <a:lnB w="12700" cap="flat" cmpd="sng" algn="ctr">
+                      <a:solidFill>
+                        <a:schemeClr val="tx1"/>
+                      </a:solidFill>
+                      <a:prstDash val="solid"/>
+                      <a:round/>
+                      <a:headEnd type="none" w="med" len="med"/>
+                      <a:tailEnd type="none" w="med" len="med"/>
+                    </a:lnB>
+                    <a:solidFill>
+                      <a:schemeClr val="tx2">
+                        <a:lumMod val="40000"/>
+                        <a:lumOff val="60000"/>
+                      </a:schemeClr>
+                    </a:solidFill>
+                  </a:tcPr>
+                </a:tc>
+              </a:tr>
+              <a:tr h="370840">
+                <a:tc>
+                  <a:txBody>
+                    <a:bodyPr/>
+                    <a:lstStyle/>
+                    <a:p>
+                      <a:r>
+                        <a:rPr lang="en-US" b="0" dirty="0" smtClean="0">
+                          <a:solidFill>
+                            <a:schemeClr val="bg1"/>
+                          </a:solidFill>
+                        </a:rPr>
+                        <a:t>RVM </a:t>
+                      </a:r>
+                      <a:r>
+                        <a:rPr lang="en-US" b="0" baseline="0" dirty="0" smtClean="0">
+                          <a:solidFill>
+                            <a:schemeClr val="bg1"/>
+                          </a:solidFill>
+                        </a:rPr>
+                        <a:t>Requirement Wording</a:t>
+                      </a:r>
+                      <a:endParaRPr lang="en-US" b="0" dirty="0">
+                        <a:solidFill>
+                          <a:schemeClr val="bg1"/>
+                        </a:solidFill>
+                      </a:endParaRPr>
+                    </a:p>
+                  </a:txBody>
+                  <a:tcPr anchor="ctr">
+                    <a:lnL w="12700" cap="flat" cmpd="sng" algn="ctr">
+                      <a:solidFill>
+                        <a:schemeClr val="tx1"/>
+                      </a:solidFill>
+                      <a:prstDash val="solid"/>
+                      <a:round/>
+                      <a:headEnd type="none" w="med" len="med"/>
+                      <a:tailEnd type="none" w="med" len="med"/>
+                    </a:lnL>
+                    <a:lnR w="12700" cap="flat" cmpd="sng" algn="ctr">
+                      <a:solidFill>
+                        <a:schemeClr val="tx1"/>
+                      </a:solidFill>
+                      <a:prstDash val="solid"/>
+                      <a:round/>
+                      <a:headEnd type="none" w="med" len="med"/>
+                      <a:tailEnd type="none" w="med" len="med"/>
+                    </a:lnR>
+                    <a:lnT w="12700" cap="flat" cmpd="sng" algn="ctr">
+                      <a:solidFill>
+                        <a:schemeClr val="tx1"/>
+                      </a:solidFill>
+                      <a:prstDash val="solid"/>
+                      <a:round/>
+                      <a:headEnd type="none" w="med" len="med"/>
+                      <a:tailEnd type="none" w="med" len="med"/>
+                    </a:lnT>
+                    <a:lnB w="12700" cap="flat" cmpd="sng" algn="ctr">
+                      <a:solidFill>
+                        <a:schemeClr val="tx1"/>
+                      </a:solidFill>
+                      <a:prstDash val="solid"/>
+                      <a:round/>
+                      <a:headEnd type="none" w="med" len="med"/>
+                      <a:tailEnd type="none" w="med" len="med"/>
+                    </a:lnB>
+                    <a:solidFill>
+                      <a:schemeClr val="tx2">
+                        <a:lumMod val="75000"/>
+                      </a:schemeClr>
+                    </a:solidFill>
+                  </a:tcPr>
+                </a:tc>
+                <a:tc>
+                  <a:txBody>
+                    <a:bodyPr/>
+                    <a:lstStyle/>
+                    <a:p>
+                      <a:r>
+                        <a:rPr lang="en-US" b="1" dirty="0" smtClean="0">
+                          <a:solidFill>
+                            <a:schemeClr val="tx1"/>
+                          </a:solidFill>
+                        </a:rPr>
+                        <a:t>The CubeSat shall incorporate a Remove</a:t>
+                      </a:r>
+                      <a:r>
+                        <a:rPr lang="en-US" b="1" baseline="0" dirty="0" smtClean="0">
+                          <a:solidFill>
+                            <a:schemeClr val="tx1"/>
+                          </a:solidFill>
+                        </a:rPr>
+                        <a:t> Before Flight pin</a:t>
+                      </a:r>
+                      <a:endParaRPr lang="en-US" b="1" dirty="0">
+                        <a:solidFill>
+                          <a:schemeClr val="tx1"/>
+                        </a:solidFill>
+                      </a:endParaRPr>
+                    </a:p>
+                  </a:txBody>
+                  <a:tcPr>
+                    <a:lnL w="12700" cap="flat" cmpd="sng" algn="ctr">
+                      <a:solidFill>
+                        <a:schemeClr val="tx1"/>
+                      </a:solidFill>
+                      <a:prstDash val="solid"/>
+                      <a:round/>
+                      <a:headEnd type="none" w="med" len="med"/>
+                      <a:tailEnd type="none" w="med" len="med"/>
+                    </a:lnL>
+                    <a:lnR w="12700" cap="flat" cmpd="sng" algn="ctr">
+                      <a:solidFill>
+                        <a:schemeClr val="tx1"/>
+                      </a:solidFill>
+                      <a:prstDash val="solid"/>
+                      <a:round/>
+                      <a:headEnd type="none" w="med" len="med"/>
+                      <a:tailEnd type="none" w="med" len="med"/>
+                    </a:lnR>
+                    <a:lnT w="12700" cap="flat" cmpd="sng" algn="ctr">
+                      <a:solidFill>
+                        <a:schemeClr val="tx1"/>
+                      </a:solidFill>
+                      <a:prstDash val="solid"/>
+                      <a:round/>
+                      <a:headEnd type="none" w="med" len="med"/>
+                      <a:tailEnd type="none" w="med" len="med"/>
+                    </a:lnT>
+                    <a:lnB w="12700" cap="flat" cmpd="sng" algn="ctr">
+                      <a:solidFill>
+                        <a:schemeClr val="tx1"/>
+                      </a:solidFill>
+                      <a:prstDash val="solid"/>
+                      <a:round/>
+                      <a:headEnd type="none" w="med" len="med"/>
+                      <a:tailEnd type="none" w="med" len="med"/>
+                    </a:lnB>
+                    <a:solidFill>
+                      <a:schemeClr val="tx2">
+                        <a:lumMod val="40000"/>
+                        <a:lumOff val="60000"/>
+                      </a:schemeClr>
+                    </a:solidFill>
+                  </a:tcPr>
+                </a:tc>
+              </a:tr>
+              <a:tr h="370840">
+                <a:tc>
+                  <a:txBody>
+                    <a:bodyPr/>
+                    <a:lstStyle/>
+                    <a:p>
+                      <a:r>
+                        <a:rPr lang="en-US" b="0" dirty="0" smtClean="0">
+                          <a:solidFill>
+                            <a:schemeClr val="bg1"/>
+                          </a:solidFill>
+                        </a:rPr>
+                        <a:t>Validation Method</a:t>
+                      </a:r>
+                      <a:endParaRPr lang="en-US" b="0" dirty="0">
+                        <a:solidFill>
+                          <a:schemeClr val="bg1"/>
+                        </a:solidFill>
+                      </a:endParaRPr>
+                    </a:p>
+                  </a:txBody>
+                  <a:tcPr anchor="ctr">
+                    <a:lnL w="12700" cap="flat" cmpd="sng" algn="ctr">
+                      <a:solidFill>
+                        <a:schemeClr val="tx1"/>
+                      </a:solidFill>
+                      <a:prstDash val="solid"/>
+                      <a:round/>
+                      <a:headEnd type="none" w="med" len="med"/>
+                      <a:tailEnd type="none" w="med" len="med"/>
+                    </a:lnL>
+                    <a:lnR w="12700" cap="flat" cmpd="sng" algn="ctr">
+                      <a:solidFill>
+                        <a:schemeClr val="tx1"/>
+                      </a:solidFill>
+                      <a:prstDash val="solid"/>
+                      <a:round/>
+                      <a:headEnd type="none" w="med" len="med"/>
+                      <a:tailEnd type="none" w="med" len="med"/>
+                    </a:lnR>
+                    <a:lnT w="12700" cap="flat" cmpd="sng" algn="ctr">
+                      <a:solidFill>
+                        <a:schemeClr val="tx1"/>
+                      </a:solidFill>
+                      <a:prstDash val="solid"/>
+                      <a:round/>
+                      <a:headEnd type="none" w="med" len="med"/>
+                      <a:tailEnd type="none" w="med" len="med"/>
+                    </a:lnT>
+                    <a:lnB w="12700" cap="flat" cmpd="sng" algn="ctr">
+                      <a:solidFill>
+                        <a:schemeClr val="tx1"/>
+                      </a:solidFill>
+                      <a:prstDash val="solid"/>
+                      <a:round/>
+                      <a:headEnd type="none" w="med" len="med"/>
+                      <a:tailEnd type="none" w="med" len="med"/>
+                    </a:lnB>
+                    <a:solidFill>
+                      <a:schemeClr val="tx2">
+                        <a:lumMod val="75000"/>
+                      </a:schemeClr>
+                    </a:solidFill>
+                  </a:tcPr>
+                </a:tc>
+                <a:tc>
+                  <a:txBody>
+                    <a:bodyPr/>
+                    <a:lstStyle/>
+                    <a:p>
+                      <a:r>
+                        <a:rPr lang="en-US" b="1" i="1" dirty="0" smtClean="0">
+                          <a:solidFill>
+                            <a:schemeClr val="tx1"/>
+                          </a:solidFill>
+                        </a:rPr>
+                        <a:t>Examine</a:t>
+                      </a:r>
+                      <a:endParaRPr lang="en-US" b="1" i="1" dirty="0">
+                        <a:solidFill>
+                          <a:schemeClr val="tx1"/>
+                        </a:solidFill>
+                      </a:endParaRPr>
+                    </a:p>
+                  </a:txBody>
+                  <a:tcPr>
+                    <a:lnL w="12700" cap="flat" cmpd="sng" algn="ctr">
+                      <a:solidFill>
+                        <a:schemeClr val="tx1"/>
+                      </a:solidFill>
+                      <a:prstDash val="solid"/>
+                      <a:round/>
+                      <a:headEnd type="none" w="med" len="med"/>
+                      <a:tailEnd type="none" w="med" len="med"/>
+                    </a:lnL>
+                    <a:lnR w="12700" cap="flat" cmpd="sng" algn="ctr">
+                      <a:solidFill>
+                        <a:schemeClr val="tx1"/>
+                      </a:solidFill>
+                      <a:prstDash val="solid"/>
+                      <a:round/>
+                      <a:headEnd type="none" w="med" len="med"/>
+                      <a:tailEnd type="none" w="med" len="med"/>
+                    </a:lnR>
+                    <a:lnT w="12700" cap="flat" cmpd="sng" algn="ctr">
+                      <a:solidFill>
+                        <a:schemeClr val="tx1"/>
+                      </a:solidFill>
+                      <a:prstDash val="solid"/>
+                      <a:round/>
+                      <a:headEnd type="none" w="med" len="med"/>
+                      <a:tailEnd type="none" w="med" len="med"/>
+                    </a:lnT>
+                    <a:lnB w="12700" cap="flat" cmpd="sng" algn="ctr">
+                      <a:solidFill>
+                        <a:schemeClr val="tx1"/>
+                      </a:solidFill>
+                      <a:prstDash val="solid"/>
+                      <a:round/>
+                      <a:headEnd type="none" w="med" len="med"/>
+                      <a:tailEnd type="none" w="med" len="med"/>
+                    </a:lnB>
+                    <a:solidFill>
+                      <a:schemeClr val="tx2">
+                        <a:lumMod val="40000"/>
+                        <a:lumOff val="60000"/>
+                      </a:schemeClr>
+                    </a:solidFill>
+                  </a:tcPr>
+                </a:tc>
+              </a:tr>
+            </a:tbl>
+          </a:graphicData>
+        </a:graphic>
+      </p:graphicFrame>
+      <p:sp>
+        <p:nvSpPr>
+          <p:cNvPr id="7" name="TextBox 6"/>
+          <p:cNvSpPr txBox="1"/>
+          <p:nvPr/>
+        </p:nvSpPr>
+        <p:spPr>
+          <a:xfrm>
+            <a:off x="381000" y="3676471"/>
+            <a:ext cx="8305800" cy="1569660"/>
+          </a:xfrm>
+          <a:prstGeom prst="rect">
+            <a:avLst/>
+          </a:prstGeom>
+          <a:noFill/>
+        </p:spPr>
+        <p:txBody>
+          <a:bodyPr wrap="square" rtlCol="0">
+            <a:spAutoFit/>
+          </a:bodyPr>
+          <a:lstStyle/>
+          <a:p>
+            <a:r>
+              <a:rPr lang="en-US" sz="2400" b="1" i="1" dirty="0" smtClean="0"/>
+              <a:t>The Remove Before Flight (RBF) pin is used to cur all power to the spacecraft by physically separating the battery circuit from the rest of the spacecraft, enabling the spacecraft to be handled safely and easily while the pin is inserted.</a:t>
+            </a:r>
+            <a:endParaRPr lang="en-US" sz="2400" b="1" i="1" dirty="0"/>
+          </a:p>
+        </p:txBody>
+      </p:sp>
+    </p:spTree>
+    <p:extLst>
+      <p:ext uri="{BB962C8B-B14F-4D97-AF65-F5344CB8AC3E}">
+        <p14:creationId xmlns:p14="http://schemas.microsoft.com/office/powerpoint/2010/main" val="3869352076"/>
       </p:ext>
     </p:extLst>
   </p:cSld>

</xml_diff>